<commit_message>
Edited README and online_retail_presentation  On branch brian  Changes to be committed: 	modified:   README.md 	modified:   online_retail_presentation.pptx
</commit_message>
<xml_diff>
--- a/online_retail_presentation.pptx
+++ b/online_retail_presentation.pptx
@@ -5,7 +5,7 @@
     <p:sldMasterId id="2147483648" r:id="rId1"/>
   </p:sldMasterIdLst>
   <p:notesMasterIdLst>
-    <p:notesMasterId r:id="rId27"/>
+    <p:notesMasterId r:id="rId28"/>
   </p:notesMasterIdLst>
   <p:sldIdLst>
     <p:sldId id="256" r:id="rId2"/>
@@ -13,26 +13,27 @@
     <p:sldId id="279" r:id="rId4"/>
     <p:sldId id="280" r:id="rId5"/>
     <p:sldId id="281" r:id="rId6"/>
-    <p:sldId id="270" r:id="rId7"/>
-    <p:sldId id="282" r:id="rId8"/>
-    <p:sldId id="258" r:id="rId9"/>
-    <p:sldId id="259" r:id="rId10"/>
-    <p:sldId id="260" r:id="rId11"/>
-    <p:sldId id="272" r:id="rId12"/>
-    <p:sldId id="273" r:id="rId13"/>
-    <p:sldId id="275" r:id="rId14"/>
-    <p:sldId id="261" r:id="rId15"/>
-    <p:sldId id="262" r:id="rId16"/>
-    <p:sldId id="277" r:id="rId17"/>
-    <p:sldId id="263" r:id="rId18"/>
-    <p:sldId id="264" r:id="rId19"/>
-    <p:sldId id="265" r:id="rId20"/>
-    <p:sldId id="278" r:id="rId21"/>
-    <p:sldId id="266" r:id="rId22"/>
-    <p:sldId id="267" r:id="rId23"/>
-    <p:sldId id="268" r:id="rId24"/>
-    <p:sldId id="269" r:id="rId25"/>
-    <p:sldId id="271" r:id="rId26"/>
+    <p:sldId id="283" r:id="rId7"/>
+    <p:sldId id="270" r:id="rId8"/>
+    <p:sldId id="282" r:id="rId9"/>
+    <p:sldId id="258" r:id="rId10"/>
+    <p:sldId id="259" r:id="rId11"/>
+    <p:sldId id="260" r:id="rId12"/>
+    <p:sldId id="272" r:id="rId13"/>
+    <p:sldId id="273" r:id="rId14"/>
+    <p:sldId id="275" r:id="rId15"/>
+    <p:sldId id="261" r:id="rId16"/>
+    <p:sldId id="262" r:id="rId17"/>
+    <p:sldId id="277" r:id="rId18"/>
+    <p:sldId id="263" r:id="rId19"/>
+    <p:sldId id="264" r:id="rId20"/>
+    <p:sldId id="265" r:id="rId21"/>
+    <p:sldId id="278" r:id="rId22"/>
+    <p:sldId id="266" r:id="rId23"/>
+    <p:sldId id="267" r:id="rId24"/>
+    <p:sldId id="268" r:id="rId25"/>
+    <p:sldId id="269" r:id="rId26"/>
+    <p:sldId id="271" r:id="rId27"/>
   </p:sldIdLst>
   <p:sldSz cx="9144000" cy="6858000" type="screen4x3"/>
   <p:notesSz cx="6858000" cy="9144000"/>
@@ -3402,7 +3403,7 @@
           <a:lstStyle/>
           <a:p>
             <a:r>
-              <a:t>Explain that RFM is a standard method to quantify customer behavior. Mention why it works well for clustering.</a:t>
+              <a:t>Walk through data shape, trends, and initial observations.</a:t>
             </a:r>
           </a:p>
         </p:txBody>
@@ -3472,7 +3473,7 @@
           <a:lstStyle/>
           <a:p>
             <a:r>
-              <a:t>Discuss how different RFM groups highlight customer value differences.</a:t>
+              <a:t>Explain that RFM is a standard method to quantify customer behavior. Mention why it works well for clustering.</a:t>
             </a:r>
           </a:p>
         </p:txBody>
@@ -3498,6 +3499,76 @@
 </file>
 
 <file path=ppt/notesSlides/notesSlide12.xml><?xml version="1.0" encoding="utf-8"?>
+<p:notes xmlns:a="http://schemas.openxmlformats.org/drawingml/2006/main" xmlns:r="http://schemas.openxmlformats.org/officeDocument/2006/relationships" xmlns:p="http://schemas.openxmlformats.org/presentationml/2006/main">
+  <p:cSld>
+    <p:spTree>
+      <p:nvGrpSpPr>
+        <p:cNvPr id="1" name=""/>
+        <p:cNvGrpSpPr/>
+        <p:nvPr/>
+      </p:nvGrpSpPr>
+      <p:grpSpPr>
+        <a:xfrm>
+          <a:off x="0" y="0"/>
+          <a:ext cx="0" cy="0"/>
+          <a:chOff x="0" y="0"/>
+          <a:chExt cx="0" cy="0"/>
+        </a:xfrm>
+      </p:grpSpPr>
+      <p:sp>
+        <p:nvSpPr>
+          <p:cNvPr id="2" name="Slide Image Placeholder 1"/>
+          <p:cNvSpPr>
+            <a:spLocks noGrp="1" noRot="1" noChangeAspect="1"/>
+          </p:cNvSpPr>
+          <p:nvPr>
+            <p:ph type="sldImg" idx="2"/>
+          </p:nvPr>
+        </p:nvSpPr>
+        <p:spPr/>
+      </p:sp>
+      <p:sp>
+        <p:nvSpPr>
+          <p:cNvPr id="3" name="Notes Placeholder 2"/>
+          <p:cNvSpPr>
+            <a:spLocks noGrp="1"/>
+          </p:cNvSpPr>
+          <p:nvPr>
+            <p:ph type="body" sz="quarter" idx="3"/>
+          </p:nvPr>
+        </p:nvSpPr>
+        <p:spPr/>
+        <p:txBody>
+          <a:bodyPr/>
+          <a:lstStyle/>
+          <a:p>
+            <a:r>
+              <a:t>Discuss how different RFM groups highlight customer value differences.</a:t>
+            </a:r>
+          </a:p>
+        </p:txBody>
+      </p:sp>
+      <p:sp>
+        <p:nvSpPr>
+          <p:cNvPr id="4" name="Slide Number Placeholder 3"/>
+          <p:cNvSpPr>
+            <a:spLocks noGrp="1"/>
+          </p:cNvSpPr>
+          <p:nvPr>
+            <p:ph type="sldNum" sz="quarter" idx="5"/>
+          </p:nvPr>
+        </p:nvSpPr>
+        <p:spPr/>
+      </p:sp>
+    </p:spTree>
+  </p:cSld>
+  <p:clrMapOvr>
+    <a:masterClrMapping/>
+  </p:clrMapOvr>
+</p:notes>
+</file>
+
+<file path=ppt/notesSlides/notesSlide13.xml><?xml version="1.0" encoding="utf-8"?>
 <p:notes xmlns:a="http://schemas.openxmlformats.org/drawingml/2006/main" xmlns:r="http://schemas.openxmlformats.org/officeDocument/2006/relationships" xmlns:p="http://schemas.openxmlformats.org/presentationml/2006/main">
   <p:cSld>
     <p:spTree>
@@ -3589,76 +3660,6 @@
         <p14:creationId xmlns:p14="http://schemas.microsoft.com/office/powerpoint/2010/main" val="2177405155"/>
       </p:ext>
     </p:extLst>
-  </p:cSld>
-  <p:clrMapOvr>
-    <a:masterClrMapping/>
-  </p:clrMapOvr>
-</p:notes>
-</file>
-
-<file path=ppt/notesSlides/notesSlide13.xml><?xml version="1.0" encoding="utf-8"?>
-<p:notes xmlns:a="http://schemas.openxmlformats.org/drawingml/2006/main" xmlns:r="http://schemas.openxmlformats.org/officeDocument/2006/relationships" xmlns:p="http://schemas.openxmlformats.org/presentationml/2006/main">
-  <p:cSld>
-    <p:spTree>
-      <p:nvGrpSpPr>
-        <p:cNvPr id="1" name=""/>
-        <p:cNvGrpSpPr/>
-        <p:nvPr/>
-      </p:nvGrpSpPr>
-      <p:grpSpPr>
-        <a:xfrm>
-          <a:off x="0" y="0"/>
-          <a:ext cx="0" cy="0"/>
-          <a:chOff x="0" y="0"/>
-          <a:chExt cx="0" cy="0"/>
-        </a:xfrm>
-      </p:grpSpPr>
-      <p:sp>
-        <p:nvSpPr>
-          <p:cNvPr id="2" name="Slide Image Placeholder 1"/>
-          <p:cNvSpPr>
-            <a:spLocks noGrp="1" noRot="1" noChangeAspect="1"/>
-          </p:cNvSpPr>
-          <p:nvPr>
-            <p:ph type="sldImg" idx="2"/>
-          </p:nvPr>
-        </p:nvSpPr>
-        <p:spPr/>
-      </p:sp>
-      <p:sp>
-        <p:nvSpPr>
-          <p:cNvPr id="3" name="Notes Placeholder 2"/>
-          <p:cNvSpPr>
-            <a:spLocks noGrp="1"/>
-          </p:cNvSpPr>
-          <p:nvPr>
-            <p:ph type="body" sz="quarter" idx="3"/>
-          </p:nvPr>
-        </p:nvSpPr>
-        <p:spPr/>
-        <p:txBody>
-          <a:bodyPr/>
-          <a:lstStyle/>
-          <a:p>
-            <a:r>
-              <a:t>Explain the intuition behind each algorithm and why testing multiple approaches matters.</a:t>
-            </a:r>
-          </a:p>
-        </p:txBody>
-      </p:sp>
-      <p:sp>
-        <p:nvSpPr>
-          <p:cNvPr id="4" name="Slide Number Placeholder 3"/>
-          <p:cNvSpPr>
-            <a:spLocks noGrp="1"/>
-          </p:cNvSpPr>
-          <p:nvPr>
-            <p:ph type="sldNum" sz="quarter" idx="5"/>
-          </p:nvPr>
-        </p:nvSpPr>
-        <p:spPr/>
-      </p:sp>
-    </p:spTree>
   </p:cSld>
   <p:clrMapOvr>
     <a:masterClrMapping/>
@@ -3711,7 +3712,7 @@
           <a:lstStyle/>
           <a:p>
             <a:r>
-              <a:t>Briefly explain how outliers affect K-Means (centroid distortion) and DBSCAN (core point density).</a:t>
+              <a:t>Explain the intuition behind each algorithm and why testing multiple approaches matters.</a:t>
             </a:r>
           </a:p>
         </p:txBody>
@@ -3781,7 +3782,7 @@
           <a:lstStyle/>
           <a:p>
             <a:r>
-              <a:t>Walk through improvements after removing outlier.</a:t>
+              <a:t>Briefly explain how outliers affect K-Means (centroid distortion) and DBSCAN (core point density).</a:t>
             </a:r>
           </a:p>
         </p:txBody>
@@ -3807,6 +3808,76 @@
 </file>
 
 <file path=ppt/notesSlides/notesSlide16.xml><?xml version="1.0" encoding="utf-8"?>
+<p:notes xmlns:a="http://schemas.openxmlformats.org/drawingml/2006/main" xmlns:r="http://schemas.openxmlformats.org/officeDocument/2006/relationships" xmlns:p="http://schemas.openxmlformats.org/presentationml/2006/main">
+  <p:cSld>
+    <p:spTree>
+      <p:nvGrpSpPr>
+        <p:cNvPr id="1" name=""/>
+        <p:cNvGrpSpPr/>
+        <p:nvPr/>
+      </p:nvGrpSpPr>
+      <p:grpSpPr>
+        <a:xfrm>
+          <a:off x="0" y="0"/>
+          <a:ext cx="0" cy="0"/>
+          <a:chOff x="0" y="0"/>
+          <a:chExt cx="0" cy="0"/>
+        </a:xfrm>
+      </p:grpSpPr>
+      <p:sp>
+        <p:nvSpPr>
+          <p:cNvPr id="2" name="Slide Image Placeholder 1"/>
+          <p:cNvSpPr>
+            <a:spLocks noGrp="1" noRot="1" noChangeAspect="1"/>
+          </p:cNvSpPr>
+          <p:nvPr>
+            <p:ph type="sldImg" idx="2"/>
+          </p:nvPr>
+        </p:nvSpPr>
+        <p:spPr/>
+      </p:sp>
+      <p:sp>
+        <p:nvSpPr>
+          <p:cNvPr id="3" name="Notes Placeholder 2"/>
+          <p:cNvSpPr>
+            <a:spLocks noGrp="1"/>
+          </p:cNvSpPr>
+          <p:nvPr>
+            <p:ph type="body" sz="quarter" idx="3"/>
+          </p:nvPr>
+        </p:nvSpPr>
+        <p:spPr/>
+        <p:txBody>
+          <a:bodyPr/>
+          <a:lstStyle/>
+          <a:p>
+            <a:r>
+              <a:t>Walk through improvements after removing outlier.</a:t>
+            </a:r>
+          </a:p>
+        </p:txBody>
+      </p:sp>
+      <p:sp>
+        <p:nvSpPr>
+          <p:cNvPr id="4" name="Slide Number Placeholder 3"/>
+          <p:cNvSpPr>
+            <a:spLocks noGrp="1"/>
+          </p:cNvSpPr>
+          <p:nvPr>
+            <p:ph type="sldNum" sz="quarter" idx="5"/>
+          </p:nvPr>
+        </p:nvSpPr>
+        <p:spPr/>
+      </p:sp>
+    </p:spTree>
+  </p:cSld>
+  <p:clrMapOvr>
+    <a:masterClrMapping/>
+  </p:clrMapOvr>
+</p:notes>
+</file>
+
+<file path=ppt/notesSlides/notesSlide17.xml><?xml version="1.0" encoding="utf-8"?>
 <p:notes xmlns:a="http://schemas.openxmlformats.org/drawingml/2006/main" xmlns:r="http://schemas.openxmlformats.org/officeDocument/2006/relationships" xmlns:p="http://schemas.openxmlformats.org/presentationml/2006/main">
   <p:cSld>
     <p:spTree>
@@ -3898,76 +3969,6 @@
         <p14:creationId xmlns:p14="http://schemas.microsoft.com/office/powerpoint/2010/main" val="2979900401"/>
       </p:ext>
     </p:extLst>
-  </p:cSld>
-  <p:clrMapOvr>
-    <a:masterClrMapping/>
-  </p:clrMapOvr>
-</p:notes>
-</file>
-
-<file path=ppt/notesSlides/notesSlide17.xml><?xml version="1.0" encoding="utf-8"?>
-<p:notes xmlns:a="http://schemas.openxmlformats.org/drawingml/2006/main" xmlns:r="http://schemas.openxmlformats.org/officeDocument/2006/relationships" xmlns:p="http://schemas.openxmlformats.org/presentationml/2006/main">
-  <p:cSld>
-    <p:spTree>
-      <p:nvGrpSpPr>
-        <p:cNvPr id="1" name=""/>
-        <p:cNvGrpSpPr/>
-        <p:nvPr/>
-      </p:nvGrpSpPr>
-      <p:grpSpPr>
-        <a:xfrm>
-          <a:off x="0" y="0"/>
-          <a:ext cx="0" cy="0"/>
-          <a:chOff x="0" y="0"/>
-          <a:chExt cx="0" cy="0"/>
-        </a:xfrm>
-      </p:grpSpPr>
-      <p:sp>
-        <p:nvSpPr>
-          <p:cNvPr id="2" name="Slide Image Placeholder 1"/>
-          <p:cNvSpPr>
-            <a:spLocks noGrp="1" noRot="1" noChangeAspect="1"/>
-          </p:cNvSpPr>
-          <p:nvPr>
-            <p:ph type="sldImg" idx="2"/>
-          </p:nvPr>
-        </p:nvSpPr>
-        <p:spPr/>
-      </p:sp>
-      <p:sp>
-        <p:nvSpPr>
-          <p:cNvPr id="3" name="Notes Placeholder 2"/>
-          <p:cNvSpPr>
-            <a:spLocks noGrp="1"/>
-          </p:cNvSpPr>
-          <p:nvPr>
-            <p:ph type="body" sz="quarter" idx="3"/>
-          </p:nvPr>
-        </p:nvSpPr>
-        <p:spPr/>
-        <p:txBody>
-          <a:bodyPr/>
-          <a:lstStyle/>
-          <a:p>
-            <a:r>
-              <a:t>Discuss challenges such as parameter sensitivity.</a:t>
-            </a:r>
-          </a:p>
-        </p:txBody>
-      </p:sp>
-      <p:sp>
-        <p:nvSpPr>
-          <p:cNvPr id="4" name="Slide Number Placeholder 3"/>
-          <p:cNvSpPr>
-            <a:spLocks noGrp="1"/>
-          </p:cNvSpPr>
-          <p:nvPr>
-            <p:ph type="sldNum" sz="quarter" idx="5"/>
-          </p:nvPr>
-        </p:nvSpPr>
-        <p:spPr/>
-      </p:sp>
-    </p:spTree>
   </p:cSld>
   <p:clrMapOvr>
     <a:masterClrMapping/>
@@ -4020,7 +4021,7 @@
           <a:lstStyle/>
           <a:p>
             <a:r>
-              <a:t>Explain why PCA is useful for visualizing high-dimensional clustering.</a:t>
+              <a:t>Discuss challenges such as parameter sensitivity.</a:t>
             </a:r>
           </a:p>
         </p:txBody>
@@ -4090,7 +4091,7 @@
           <a:lstStyle/>
           <a:p>
             <a:r>
-              <a:t>Highlight the meaning of each cluster: high spenders, frequent buyers, dormant customers.</a:t>
+              <a:t>Explain why PCA is useful for visualizing high-dimensional clustering.</a:t>
             </a:r>
           </a:p>
         </p:txBody>
@@ -4230,7 +4231,7 @@
           <a:lstStyle/>
           <a:p>
             <a:r>
-              <a:t>Quickly summarize what worked best and why.</a:t>
+              <a:t>Highlight the meaning of each cluster: high spenders, frequent buyers, dormant customers.</a:t>
             </a:r>
           </a:p>
         </p:txBody>
@@ -4256,6 +4257,76 @@
 </file>
 
 <file path=ppt/notesSlides/notesSlide21.xml><?xml version="1.0" encoding="utf-8"?>
+<p:notes xmlns:a="http://schemas.openxmlformats.org/drawingml/2006/main" xmlns:r="http://schemas.openxmlformats.org/officeDocument/2006/relationships" xmlns:p="http://schemas.openxmlformats.org/presentationml/2006/main">
+  <p:cSld>
+    <p:spTree>
+      <p:nvGrpSpPr>
+        <p:cNvPr id="1" name=""/>
+        <p:cNvGrpSpPr/>
+        <p:nvPr/>
+      </p:nvGrpSpPr>
+      <p:grpSpPr>
+        <a:xfrm>
+          <a:off x="0" y="0"/>
+          <a:ext cx="0" cy="0"/>
+          <a:chOff x="0" y="0"/>
+          <a:chExt cx="0" cy="0"/>
+        </a:xfrm>
+      </p:grpSpPr>
+      <p:sp>
+        <p:nvSpPr>
+          <p:cNvPr id="2" name="Slide Image Placeholder 1"/>
+          <p:cNvSpPr>
+            <a:spLocks noGrp="1" noRot="1" noChangeAspect="1"/>
+          </p:cNvSpPr>
+          <p:nvPr>
+            <p:ph type="sldImg" idx="2"/>
+          </p:nvPr>
+        </p:nvSpPr>
+        <p:spPr/>
+      </p:sp>
+      <p:sp>
+        <p:nvSpPr>
+          <p:cNvPr id="3" name="Notes Placeholder 2"/>
+          <p:cNvSpPr>
+            <a:spLocks noGrp="1"/>
+          </p:cNvSpPr>
+          <p:nvPr>
+            <p:ph type="body" sz="quarter" idx="3"/>
+          </p:nvPr>
+        </p:nvSpPr>
+        <p:spPr/>
+        <p:txBody>
+          <a:bodyPr/>
+          <a:lstStyle/>
+          <a:p>
+            <a:r>
+              <a:t>Quickly summarize what worked best and why.</a:t>
+            </a:r>
+          </a:p>
+        </p:txBody>
+      </p:sp>
+      <p:sp>
+        <p:nvSpPr>
+          <p:cNvPr id="4" name="Slide Number Placeholder 3"/>
+          <p:cNvSpPr>
+            <a:spLocks noGrp="1"/>
+          </p:cNvSpPr>
+          <p:nvPr>
+            <p:ph type="sldNum" sz="quarter" idx="5"/>
+          </p:nvPr>
+        </p:nvSpPr>
+        <p:spPr/>
+      </p:sp>
+    </p:spTree>
+  </p:cSld>
+  <p:clrMapOvr>
+    <a:masterClrMapping/>
+  </p:clrMapOvr>
+</p:notes>
+</file>
+
+<file path=ppt/notesSlides/notesSlide22.xml><?xml version="1.0" encoding="utf-8"?>
 <p:notes xmlns:a="http://schemas.openxmlformats.org/drawingml/2006/main" xmlns:r="http://schemas.openxmlformats.org/officeDocument/2006/relationships" xmlns:p="http://schemas.openxmlformats.org/presentationml/2006/main">
   <p:cSld>
     <p:spTree>
@@ -4627,7 +4698,13 @@
   <p:cSld>
     <p:spTree>
       <p:nvGrpSpPr>
-        <p:cNvPr id="1" name=""/>
+        <p:cNvPr id="1" name="">
+          <a:extLst>
+            <a:ext uri="{FF2B5EF4-FFF2-40B4-BE49-F238E27FC236}">
+              <a16:creationId xmlns:a16="http://schemas.microsoft.com/office/drawing/2014/main" id="{AB8B654A-3193-8062-404F-554D5D09D811}"/>
+            </a:ext>
+          </a:extLst>
+        </p:cNvPr>
         <p:cNvGrpSpPr/>
         <p:nvPr/>
       </p:nvGrpSpPr>
@@ -4641,7 +4718,13 @@
       </p:grpSpPr>
       <p:sp>
         <p:nvSpPr>
-          <p:cNvPr id="2" name="Slide Image Placeholder 1"/>
+          <p:cNvPr id="2" name="Slide Image Placeholder 1">
+            <a:extLst>
+              <a:ext uri="{FF2B5EF4-FFF2-40B4-BE49-F238E27FC236}">
+                <a16:creationId xmlns:a16="http://schemas.microsoft.com/office/drawing/2014/main" id="{15E18133-ABCA-721F-B074-D4E334E7E36D}"/>
+              </a:ext>
+            </a:extLst>
+          </p:cNvPr>
           <p:cNvSpPr>
             <a:spLocks noGrp="1" noRot="1" noChangeAspect="1"/>
           </p:cNvSpPr>
@@ -4653,7 +4736,13 @@
       </p:sp>
       <p:sp>
         <p:nvSpPr>
-          <p:cNvPr id="3" name="Notes Placeholder 2"/>
+          <p:cNvPr id="3" name="Notes Placeholder 2">
+            <a:extLst>
+              <a:ext uri="{FF2B5EF4-FFF2-40B4-BE49-F238E27FC236}">
+                <a16:creationId xmlns:a16="http://schemas.microsoft.com/office/drawing/2014/main" id="{185B1550-61E7-F485-1AE9-DFC44E682376}"/>
+              </a:ext>
+            </a:extLst>
+          </p:cNvPr>
           <p:cNvSpPr>
             <a:spLocks noGrp="1"/>
           </p:cNvSpPr>
@@ -4667,14 +4756,20 @@
           <a:lstStyle/>
           <a:p>
             <a:r>
-              <a:t>Close with forward-looking ideas.</a:t>
-            </a:r>
-          </a:p>
-        </p:txBody>
-      </p:sp>
-      <p:sp>
-        <p:nvSpPr>
-          <p:cNvPr id="4" name="Slide Number Placeholder 3"/>
+              <a:t>Explain how RFM ties into customer behavior analysis and why clustering is useful.</a:t>
+            </a:r>
+          </a:p>
+        </p:txBody>
+      </p:sp>
+      <p:sp>
+        <p:nvSpPr>
+          <p:cNvPr id="4" name="Slide Number Placeholder 3">
+            <a:extLst>
+              <a:ext uri="{FF2B5EF4-FFF2-40B4-BE49-F238E27FC236}">
+                <a16:creationId xmlns:a16="http://schemas.microsoft.com/office/drawing/2014/main" id="{DC5B243A-F98D-BD8F-C6CA-562C3D4DEC3F}"/>
+              </a:ext>
+            </a:extLst>
+          </p:cNvPr>
           <p:cNvSpPr>
             <a:spLocks noGrp="1"/>
           </p:cNvSpPr>
@@ -4685,6 +4780,11 @@
         <p:spPr/>
       </p:sp>
     </p:spTree>
+    <p:extLst>
+      <p:ext uri="{BB962C8B-B14F-4D97-AF65-F5344CB8AC3E}">
+        <p14:creationId xmlns:p14="http://schemas.microsoft.com/office/powerpoint/2010/main" val="2501829495"/>
+      </p:ext>
+    </p:extLst>
   </p:cSld>
   <p:clrMapOvr>
     <a:masterClrMapping/>
@@ -4737,7 +4837,7 @@
           <a:lstStyle/>
           <a:p>
             <a:r>
-              <a:t>Highlight that the data is transactional and requires aggregation into customer-level features.</a:t>
+              <a:t>Close with forward-looking ideas.</a:t>
             </a:r>
           </a:p>
         </p:txBody>
@@ -4807,7 +4907,7 @@
           <a:lstStyle/>
           <a:p>
             <a:r>
-              <a:t>Explain why preprocessing is critical for reliable clustering. Mention handling outliers.</a:t>
+              <a:t>Highlight that the data is transactional and requires aggregation into customer-level features.</a:t>
             </a:r>
           </a:p>
         </p:txBody>
@@ -4877,7 +4977,7 @@
           <a:lstStyle/>
           <a:p>
             <a:r>
-              <a:t>Walk through data shape, trends, and initial observations.</a:t>
+              <a:t>Explain why preprocessing is critical for reliable clustering. Mention handling outliers.</a:t>
             </a:r>
           </a:p>
         </p:txBody>
@@ -5081,7 +5181,7 @@
           <a:p>
             <a:fld id="{5BCAD085-E8A6-8845-BD4E-CB4CCA059FC4}" type="datetimeFigureOut">
               <a:rPr lang="en-US" smtClean="0"/>
-              <a:t>11/13/25</a:t>
+              <a:t>11/14/25</a:t>
             </a:fld>
             <a:endParaRPr lang="en-US"/>
           </a:p>
@@ -5249,7 +5349,7 @@
           <a:p>
             <a:fld id="{5BCAD085-E8A6-8845-BD4E-CB4CCA059FC4}" type="datetimeFigureOut">
               <a:rPr lang="en-US" smtClean="0"/>
-              <a:t>11/13/25</a:t>
+              <a:t>11/14/25</a:t>
             </a:fld>
             <a:endParaRPr lang="en-US"/>
           </a:p>
@@ -5427,7 +5527,7 @@
           <a:p>
             <a:fld id="{5BCAD085-E8A6-8845-BD4E-CB4CCA059FC4}" type="datetimeFigureOut">
               <a:rPr lang="en-US" smtClean="0"/>
-              <a:t>11/13/25</a:t>
+              <a:t>11/14/25</a:t>
             </a:fld>
             <a:endParaRPr lang="en-US"/>
           </a:p>
@@ -5595,7 +5695,7 @@
           <a:p>
             <a:fld id="{5BCAD085-E8A6-8845-BD4E-CB4CCA059FC4}" type="datetimeFigureOut">
               <a:rPr lang="en-US" smtClean="0"/>
-              <a:t>11/13/25</a:t>
+              <a:t>11/14/25</a:t>
             </a:fld>
             <a:endParaRPr lang="en-US"/>
           </a:p>
@@ -5840,7 +5940,7 @@
           <a:p>
             <a:fld id="{5BCAD085-E8A6-8845-BD4E-CB4CCA059FC4}" type="datetimeFigureOut">
               <a:rPr lang="en-US" smtClean="0"/>
-              <a:t>11/13/25</a:t>
+              <a:t>11/14/25</a:t>
             </a:fld>
             <a:endParaRPr lang="en-US"/>
           </a:p>
@@ -6125,7 +6225,7 @@
           <a:p>
             <a:fld id="{5BCAD085-E8A6-8845-BD4E-CB4CCA059FC4}" type="datetimeFigureOut">
               <a:rPr lang="en-US" smtClean="0"/>
-              <a:t>11/13/25</a:t>
+              <a:t>11/14/25</a:t>
             </a:fld>
             <a:endParaRPr lang="en-US"/>
           </a:p>
@@ -6544,7 +6644,7 @@
           <a:p>
             <a:fld id="{5BCAD085-E8A6-8845-BD4E-CB4CCA059FC4}" type="datetimeFigureOut">
               <a:rPr lang="en-US" smtClean="0"/>
-              <a:t>11/13/25</a:t>
+              <a:t>11/14/25</a:t>
             </a:fld>
             <a:endParaRPr lang="en-US"/>
           </a:p>
@@ -6661,7 +6761,7 @@
           <a:p>
             <a:fld id="{5BCAD085-E8A6-8845-BD4E-CB4CCA059FC4}" type="datetimeFigureOut">
               <a:rPr lang="en-US" smtClean="0"/>
-              <a:t>11/13/25</a:t>
+              <a:t>11/14/25</a:t>
             </a:fld>
             <a:endParaRPr lang="en-US"/>
           </a:p>
@@ -6756,7 +6856,7 @@
           <a:p>
             <a:fld id="{5BCAD085-E8A6-8845-BD4E-CB4CCA059FC4}" type="datetimeFigureOut">
               <a:rPr lang="en-US" smtClean="0"/>
-              <a:t>11/13/25</a:t>
+              <a:t>11/14/25</a:t>
             </a:fld>
             <a:endParaRPr lang="en-US"/>
           </a:p>
@@ -7031,7 +7131,7 @@
           <a:p>
             <a:fld id="{5BCAD085-E8A6-8845-BD4E-CB4CCA059FC4}" type="datetimeFigureOut">
               <a:rPr lang="en-US" smtClean="0"/>
-              <a:t>11/13/25</a:t>
+              <a:t>11/14/25</a:t>
             </a:fld>
             <a:endParaRPr lang="en-US"/>
           </a:p>
@@ -7283,7 +7383,7 @@
           <a:p>
             <a:fld id="{5BCAD085-E8A6-8845-BD4E-CB4CCA059FC4}" type="datetimeFigureOut">
               <a:rPr lang="en-US" smtClean="0"/>
-              <a:t>11/13/25</a:t>
+              <a:t>11/14/25</a:t>
             </a:fld>
             <a:endParaRPr lang="en-US"/>
           </a:p>
@@ -7494,7 +7594,7 @@
           <a:p>
             <a:fld id="{5BCAD085-E8A6-8845-BD4E-CB4CCA059FC4}" type="datetimeFigureOut">
               <a:rPr lang="en-US" smtClean="0"/>
-              <a:t>11/13/25</a:t>
+              <a:t>11/14/25</a:t>
             </a:fld>
             <a:endParaRPr lang="en-US"/>
           </a:p>
@@ -8640,6 +8740,320 @@
       </p:grpSpPr>
       <p:sp useBgFill="1">
         <p:nvSpPr>
+          <p:cNvPr id="8" name="Rectangle 7">
+            <a:extLst>
+              <a:ext uri="{FF2B5EF4-FFF2-40B4-BE49-F238E27FC236}">
+                <a16:creationId xmlns:a16="http://schemas.microsoft.com/office/drawing/2014/main" id="{081EA652-8C6A-4E69-BEB9-170809474553}"/>
+              </a:ext>
+              <a:ext uri="{C183D7F6-B498-43B3-948B-1728B52AA6E4}">
+                <adec:decorative xmlns:adec="http://schemas.microsoft.com/office/drawing/2017/decorative" val="1"/>
+              </a:ext>
+            </a:extLst>
+          </p:cNvPr>
+          <p:cNvSpPr>
+            <a:spLocks noGrp="1" noRot="1" noChangeAspect="1" noMove="1" noResize="1" noEditPoints="1" noAdjustHandles="1" noChangeArrowheads="1" noChangeShapeType="1" noTextEdit="1"/>
+          </p:cNvSpPr>
+          <p:nvPr>
+            <p:extLst>
+              <p:ext uri="{386F3935-93C4-4BCD-93E2-E3B085C9AB24}">
+                <p16:designElem xmlns:p16="http://schemas.microsoft.com/office/powerpoint/2015/main" val="1"/>
+              </p:ext>
+            </p:extLst>
+          </p:nvPr>
+        </p:nvSpPr>
+        <p:spPr>
+          <a:xfrm>
+            <a:off x="0" y="0"/>
+            <a:ext cx="9144000" cy="6858000"/>
+          </a:xfrm>
+          <a:prstGeom prst="rect">
+            <a:avLst/>
+          </a:prstGeom>
+          <a:ln>
+            <a:noFill/>
+          </a:ln>
+        </p:spPr>
+        <p:style>
+          <a:lnRef idx="2">
+            <a:schemeClr val="accent1">
+              <a:shade val="50000"/>
+            </a:schemeClr>
+          </a:lnRef>
+          <a:fillRef idx="1">
+            <a:schemeClr val="accent1"/>
+          </a:fillRef>
+          <a:effectRef idx="0">
+            <a:schemeClr val="accent1"/>
+          </a:effectRef>
+          <a:fontRef idx="minor">
+            <a:schemeClr val="lt1"/>
+          </a:fontRef>
+        </p:style>
+        <p:txBody>
+          <a:bodyPr rtlCol="0" anchor="ctr"/>
+          <a:lstStyle/>
+          <a:p>
+            <a:pPr algn="ctr"/>
+            <a:endParaRPr lang="en-US"/>
+          </a:p>
+        </p:txBody>
+      </p:sp>
+      <p:sp>
+        <p:nvSpPr>
+          <p:cNvPr id="10" name="Right Triangle 9">
+            <a:extLst>
+              <a:ext uri="{FF2B5EF4-FFF2-40B4-BE49-F238E27FC236}">
+                <a16:creationId xmlns:a16="http://schemas.microsoft.com/office/drawing/2014/main" id="{5298780A-33B9-4EA2-8F67-DE68AD62841B}"/>
+              </a:ext>
+              <a:ext uri="{C183D7F6-B498-43B3-948B-1728B52AA6E4}">
+                <adec:decorative xmlns:adec="http://schemas.microsoft.com/office/drawing/2017/decorative" val="1"/>
+              </a:ext>
+            </a:extLst>
+          </p:cNvPr>
+          <p:cNvSpPr>
+            <a:spLocks noGrp="1" noRot="1" noChangeAspect="1" noMove="1" noResize="1" noEditPoints="1" noAdjustHandles="1" noChangeArrowheads="1" noChangeShapeType="1" noTextEdit="1"/>
+          </p:cNvSpPr>
+          <p:nvPr>
+            <p:extLst>
+              <p:ext uri="{386F3935-93C4-4BCD-93E2-E3B085C9AB24}">
+                <p16:designElem xmlns:p16="http://schemas.microsoft.com/office/powerpoint/2015/main" val="1"/>
+              </p:ext>
+            </p:extLst>
+          </p:nvPr>
+        </p:nvSpPr>
+        <p:spPr>
+          <a:xfrm flipH="1">
+            <a:off x="6432540" y="3335867"/>
+            <a:ext cx="2468880" cy="3200400"/>
+          </a:xfrm>
+          <a:prstGeom prst="rtTriangle">
+            <a:avLst/>
+          </a:prstGeom>
+          <a:solidFill>
+            <a:schemeClr val="accent4"/>
+          </a:solidFill>
+          <a:ln>
+            <a:noFill/>
+          </a:ln>
+        </p:spPr>
+        <p:style>
+          <a:lnRef idx="2">
+            <a:schemeClr val="accent1">
+              <a:shade val="50000"/>
+            </a:schemeClr>
+          </a:lnRef>
+          <a:fillRef idx="1">
+            <a:schemeClr val="accent1"/>
+          </a:fillRef>
+          <a:effectRef idx="0">
+            <a:schemeClr val="accent1"/>
+          </a:effectRef>
+          <a:fontRef idx="minor">
+            <a:schemeClr val="lt1"/>
+          </a:fontRef>
+        </p:style>
+        <p:txBody>
+          <a:bodyPr rtlCol="0" anchor="ctr"/>
+          <a:lstStyle/>
+          <a:p>
+            <a:pPr algn="ctr"/>
+            <a:endParaRPr lang="en-US" dirty="0"/>
+          </a:p>
+        </p:txBody>
+      </p:sp>
+      <p:sp>
+        <p:nvSpPr>
+          <p:cNvPr id="12" name="Rectangle 11">
+            <a:extLst>
+              <a:ext uri="{FF2B5EF4-FFF2-40B4-BE49-F238E27FC236}">
+                <a16:creationId xmlns:a16="http://schemas.microsoft.com/office/drawing/2014/main" id="{7F488E8B-4E1E-4402-8935-D4E6C02615C7}"/>
+              </a:ext>
+              <a:ext uri="{C183D7F6-B498-43B3-948B-1728B52AA6E4}">
+                <adec:decorative xmlns:adec="http://schemas.microsoft.com/office/drawing/2017/decorative" val="1"/>
+              </a:ext>
+            </a:extLst>
+          </p:cNvPr>
+          <p:cNvSpPr>
+            <a:spLocks noGrp="1" noRot="1" noChangeAspect="1" noMove="1" noResize="1" noEditPoints="1" noAdjustHandles="1" noChangeArrowheads="1" noChangeShapeType="1" noTextEdit="1"/>
+          </p:cNvSpPr>
+          <p:nvPr>
+            <p:extLst>
+              <p:ext uri="{386F3935-93C4-4BCD-93E2-E3B085C9AB24}">
+                <p16:designElem xmlns:p16="http://schemas.microsoft.com/office/powerpoint/2015/main" val="1"/>
+              </p:ext>
+            </p:extLst>
+          </p:nvPr>
+        </p:nvSpPr>
+        <p:spPr>
+          <a:xfrm>
+            <a:off x="481330" y="623275"/>
+            <a:ext cx="8178790" cy="5607882"/>
+          </a:xfrm>
+          <a:prstGeom prst="rect">
+            <a:avLst/>
+          </a:prstGeom>
+          <a:noFill/>
+          <a:ln w="19050">
+            <a:solidFill>
+              <a:schemeClr val="tx1">
+                <a:lumMod val="75000"/>
+                <a:lumOff val="25000"/>
+              </a:schemeClr>
+            </a:solidFill>
+          </a:ln>
+        </p:spPr>
+        <p:style>
+          <a:lnRef idx="2">
+            <a:schemeClr val="accent1">
+              <a:shade val="50000"/>
+            </a:schemeClr>
+          </a:lnRef>
+          <a:fillRef idx="1">
+            <a:schemeClr val="accent1"/>
+          </a:fillRef>
+          <a:effectRef idx="0">
+            <a:schemeClr val="accent1"/>
+          </a:effectRef>
+          <a:fontRef idx="minor">
+            <a:schemeClr val="lt1"/>
+          </a:fontRef>
+        </p:style>
+        <p:txBody>
+          <a:bodyPr rtlCol="0" anchor="ctr"/>
+          <a:lstStyle/>
+          <a:p>
+            <a:pPr algn="ctr"/>
+            <a:endParaRPr lang="en-US"/>
+          </a:p>
+        </p:txBody>
+      </p:sp>
+      <p:sp>
+        <p:nvSpPr>
+          <p:cNvPr id="2" name="Title 1"/>
+          <p:cNvSpPr>
+            <a:spLocks noGrp="1"/>
+          </p:cNvSpPr>
+          <p:nvPr>
+            <p:ph type="title"/>
+          </p:nvPr>
+        </p:nvSpPr>
+        <p:spPr>
+          <a:xfrm>
+            <a:off x="963930" y="1050595"/>
+            <a:ext cx="6056111" cy="1618489"/>
+          </a:xfrm>
+        </p:spPr>
+        <p:txBody>
+          <a:bodyPr anchor="ctr">
+            <a:normAutofit/>
+          </a:bodyPr>
+          <a:lstStyle/>
+          <a:p>
+            <a:pPr>
+              <a:lnSpc>
+                <a:spcPct val="90000"/>
+              </a:lnSpc>
+            </a:pPr>
+            <a:r>
+              <a:rPr lang="en-CA" sz="5400" dirty="0">
+                <a:solidFill>
+                  <a:schemeClr val="accent1">
+                    <a:lumMod val="75000"/>
+                  </a:schemeClr>
+                </a:solidFill>
+              </a:rPr>
+              <a:t>Data Cleaning &amp; Preprocessing</a:t>
+            </a:r>
+          </a:p>
+        </p:txBody>
+      </p:sp>
+      <p:sp>
+        <p:nvSpPr>
+          <p:cNvPr id="3" name="Content Placeholder 2"/>
+          <p:cNvSpPr>
+            <a:spLocks noGrp="1"/>
+          </p:cNvSpPr>
+          <p:nvPr>
+            <p:ph idx="1"/>
+          </p:nvPr>
+        </p:nvSpPr>
+        <p:spPr>
+          <a:xfrm>
+            <a:off x="963930" y="2969469"/>
+            <a:ext cx="6056111" cy="2800395"/>
+          </a:xfrm>
+        </p:spPr>
+        <p:txBody>
+          <a:bodyPr anchor="t">
+            <a:normAutofit/>
+          </a:bodyPr>
+          <a:lstStyle/>
+          <a:p>
+            <a:r>
+              <a:rPr lang="en-CA" sz="2400" dirty="0"/>
+              <a:t>Removed cancellations &amp; invalid transactions</a:t>
+            </a:r>
+          </a:p>
+          <a:p>
+            <a:r>
+              <a:rPr lang="en-CA" sz="2400" dirty="0"/>
+              <a:t>Added Year, Month, Subtotal, Cancellation Flag</a:t>
+            </a:r>
+          </a:p>
+          <a:p>
+            <a:r>
+              <a:rPr lang="en-CA" sz="2400" dirty="0"/>
+              <a:t>Handled missing </a:t>
+            </a:r>
+            <a:r>
+              <a:rPr lang="en-CA" sz="2400" dirty="0" err="1"/>
+              <a:t>CustomerID</a:t>
+            </a:r>
+            <a:endParaRPr lang="en-CA" sz="2400" dirty="0"/>
+          </a:p>
+          <a:p>
+            <a:r>
+              <a:rPr lang="en-CA" sz="2400" dirty="0"/>
+              <a:t>Final dataset ~538K rows</a:t>
+            </a:r>
+          </a:p>
+        </p:txBody>
+      </p:sp>
+    </p:spTree>
+  </p:cSld>
+  <p:clrMapOvr>
+    <a:masterClrMapping/>
+  </p:clrMapOvr>
+</p:sld>
+</file>
+
+<file path=ppt/slides/slide11.xml><?xml version="1.0" encoding="utf-8"?>
+<p:sld xmlns:a="http://schemas.openxmlformats.org/drawingml/2006/main" xmlns:r="http://schemas.openxmlformats.org/officeDocument/2006/relationships" xmlns:p="http://schemas.openxmlformats.org/presentationml/2006/main">
+  <p:cSld>
+    <p:bg>
+      <p:bgPr>
+        <a:solidFill>
+          <a:schemeClr val="bg1"/>
+        </a:solidFill>
+        <a:effectLst/>
+      </p:bgPr>
+    </p:bg>
+    <p:spTree>
+      <p:nvGrpSpPr>
+        <p:cNvPr id="1" name=""/>
+        <p:cNvGrpSpPr/>
+        <p:nvPr/>
+      </p:nvGrpSpPr>
+      <p:grpSpPr>
+        <a:xfrm>
+          <a:off x="0" y="0"/>
+          <a:ext cx="0" cy="0"/>
+          <a:chOff x="0" y="0"/>
+          <a:chExt cx="0" cy="0"/>
+        </a:xfrm>
+      </p:grpSpPr>
+      <p:sp useBgFill="1">
+        <p:nvSpPr>
           <p:cNvPr id="9" name="Rectangle 8">
             <a:extLst>
               <a:ext uri="{FF2B5EF4-FFF2-40B4-BE49-F238E27FC236}">
@@ -9013,7 +9427,7 @@
 </p:sld>
 </file>
 
-<file path=ppt/slides/slide11.xml><?xml version="1.0" encoding="utf-8"?>
+<file path=ppt/slides/slide12.xml><?xml version="1.0" encoding="utf-8"?>
 <p:sld xmlns:a="http://schemas.openxmlformats.org/drawingml/2006/main" xmlns:r="http://schemas.openxmlformats.org/officeDocument/2006/relationships" xmlns:p="http://schemas.openxmlformats.org/presentationml/2006/main">
   <p:cSld>
     <p:bg>
@@ -9193,7 +9607,7 @@
 </p:sld>
 </file>
 
-<file path=ppt/slides/slide12.xml><?xml version="1.0" encoding="utf-8"?>
+<file path=ppt/slides/slide13.xml><?xml version="1.0" encoding="utf-8"?>
 <p:sld xmlns:a="http://schemas.openxmlformats.org/drawingml/2006/main" xmlns:r="http://schemas.openxmlformats.org/officeDocument/2006/relationships" xmlns:p="http://schemas.openxmlformats.org/presentationml/2006/main">
   <p:cSld>
     <p:bg>
@@ -9373,7 +9787,7 @@
 </p:sld>
 </file>
 
-<file path=ppt/slides/slide13.xml><?xml version="1.0" encoding="utf-8"?>
+<file path=ppt/slides/slide14.xml><?xml version="1.0" encoding="utf-8"?>
 <p:sld xmlns:a="http://schemas.openxmlformats.org/drawingml/2006/main" xmlns:r="http://schemas.openxmlformats.org/officeDocument/2006/relationships" xmlns:p="http://schemas.openxmlformats.org/presentationml/2006/main">
   <p:cSld>
     <p:bg>
@@ -9559,7 +9973,7 @@
 </p:sld>
 </file>
 
-<file path=ppt/slides/slide14.xml><?xml version="1.0" encoding="utf-8"?>
+<file path=ppt/slides/slide15.xml><?xml version="1.0" encoding="utf-8"?>
 <p:sld xmlns:a="http://schemas.openxmlformats.org/drawingml/2006/main" xmlns:r="http://schemas.openxmlformats.org/officeDocument/2006/relationships" xmlns:p="http://schemas.openxmlformats.org/presentationml/2006/main">
   <p:cSld>
     <p:bg>
@@ -9929,7 +10343,7 @@
 </p:sld>
 </file>
 
-<file path=ppt/slides/slide15.xml><?xml version="1.0" encoding="utf-8"?>
+<file path=ppt/slides/slide16.xml><?xml version="1.0" encoding="utf-8"?>
 <p:sld xmlns:a="http://schemas.openxmlformats.org/drawingml/2006/main" xmlns:r="http://schemas.openxmlformats.org/officeDocument/2006/relationships" xmlns:p="http://schemas.openxmlformats.org/presentationml/2006/main">
   <p:cSld>
     <p:bg>
@@ -10248,7 +10662,7 @@
 </p:sld>
 </file>
 
-<file path=ppt/slides/slide16.xml><?xml version="1.0" encoding="utf-8"?>
+<file path=ppt/slides/slide17.xml><?xml version="1.0" encoding="utf-8"?>
 <p:sld xmlns:a="http://schemas.openxmlformats.org/drawingml/2006/main" xmlns:r="http://schemas.openxmlformats.org/officeDocument/2006/relationships" xmlns:p="http://schemas.openxmlformats.org/presentationml/2006/main">
   <p:cSld>
     <p:bg>
@@ -10782,7 +11196,7 @@
 </p:sld>
 </file>
 
-<file path=ppt/slides/slide17.xml><?xml version="1.0" encoding="utf-8"?>
+<file path=ppt/slides/slide18.xml><?xml version="1.0" encoding="utf-8"?>
 <p:sld xmlns:a="http://schemas.openxmlformats.org/drawingml/2006/main" xmlns:r="http://schemas.openxmlformats.org/officeDocument/2006/relationships" xmlns:p="http://schemas.openxmlformats.org/presentationml/2006/main">
   <p:cSld>
     <p:bg>
@@ -10996,7 +11410,7 @@
 </p:sld>
 </file>
 
-<file path=ppt/slides/slide18.xml><?xml version="1.0" encoding="utf-8"?>
+<file path=ppt/slides/slide19.xml><?xml version="1.0" encoding="utf-8"?>
 <p:sld xmlns:a="http://schemas.openxmlformats.org/drawingml/2006/main" xmlns:r="http://schemas.openxmlformats.org/officeDocument/2006/relationships" xmlns:p="http://schemas.openxmlformats.org/presentationml/2006/main">
   <p:cSld>
     <p:bg>
@@ -11245,7 +11659,305 @@
 </p:sld>
 </file>
 
-<file path=ppt/slides/slide19.xml><?xml version="1.0" encoding="utf-8"?>
+<file path=ppt/slides/slide2.xml><?xml version="1.0" encoding="utf-8"?>
+<p:sld xmlns:a="http://schemas.openxmlformats.org/drawingml/2006/main" xmlns:r="http://schemas.openxmlformats.org/officeDocument/2006/relationships" xmlns:p="http://schemas.openxmlformats.org/presentationml/2006/main">
+  <p:cSld>
+    <p:bg>
+      <p:bgPr>
+        <a:solidFill>
+          <a:schemeClr val="bg1"/>
+        </a:solidFill>
+        <a:effectLst/>
+      </p:bgPr>
+    </p:bg>
+    <p:spTree>
+      <p:nvGrpSpPr>
+        <p:cNvPr id="1" name=""/>
+        <p:cNvGrpSpPr/>
+        <p:nvPr/>
+      </p:nvGrpSpPr>
+      <p:grpSpPr>
+        <a:xfrm>
+          <a:off x="0" y="0"/>
+          <a:ext cx="0" cy="0"/>
+          <a:chOff x="0" y="0"/>
+          <a:chExt cx="0" cy="0"/>
+        </a:xfrm>
+      </p:grpSpPr>
+      <p:sp useBgFill="1">
+        <p:nvSpPr>
+          <p:cNvPr id="8" name="Rectangle 7">
+            <a:extLst>
+              <a:ext uri="{FF2B5EF4-FFF2-40B4-BE49-F238E27FC236}">
+                <a16:creationId xmlns:a16="http://schemas.microsoft.com/office/drawing/2014/main" id="{081EA652-8C6A-4E69-BEB9-170809474553}"/>
+              </a:ext>
+              <a:ext uri="{C183D7F6-B498-43B3-948B-1728B52AA6E4}">
+                <adec:decorative xmlns:adec="http://schemas.microsoft.com/office/drawing/2017/decorative" val="1"/>
+              </a:ext>
+            </a:extLst>
+          </p:cNvPr>
+          <p:cNvSpPr>
+            <a:spLocks noGrp="1" noRot="1" noChangeAspect="1" noMove="1" noResize="1" noEditPoints="1" noAdjustHandles="1" noChangeArrowheads="1" noChangeShapeType="1" noTextEdit="1"/>
+          </p:cNvSpPr>
+          <p:nvPr>
+            <p:extLst>
+              <p:ext uri="{386F3935-93C4-4BCD-93E2-E3B085C9AB24}">
+                <p16:designElem xmlns:p16="http://schemas.microsoft.com/office/powerpoint/2015/main" val="1"/>
+              </p:ext>
+            </p:extLst>
+          </p:nvPr>
+        </p:nvSpPr>
+        <p:spPr>
+          <a:xfrm>
+            <a:off x="0" y="0"/>
+            <a:ext cx="9144000" cy="6858000"/>
+          </a:xfrm>
+          <a:prstGeom prst="rect">
+            <a:avLst/>
+          </a:prstGeom>
+          <a:ln>
+            <a:noFill/>
+          </a:ln>
+        </p:spPr>
+        <p:style>
+          <a:lnRef idx="2">
+            <a:schemeClr val="accent1">
+              <a:shade val="50000"/>
+            </a:schemeClr>
+          </a:lnRef>
+          <a:fillRef idx="1">
+            <a:schemeClr val="accent1"/>
+          </a:fillRef>
+          <a:effectRef idx="0">
+            <a:schemeClr val="accent1"/>
+          </a:effectRef>
+          <a:fontRef idx="minor">
+            <a:schemeClr val="lt1"/>
+          </a:fontRef>
+        </p:style>
+        <p:txBody>
+          <a:bodyPr rtlCol="0" anchor="ctr"/>
+          <a:lstStyle/>
+          <a:p>
+            <a:pPr algn="ctr"/>
+            <a:endParaRPr lang="en-US"/>
+          </a:p>
+        </p:txBody>
+      </p:sp>
+      <p:sp>
+        <p:nvSpPr>
+          <p:cNvPr id="10" name="Right Triangle 9">
+            <a:extLst>
+              <a:ext uri="{FF2B5EF4-FFF2-40B4-BE49-F238E27FC236}">
+                <a16:creationId xmlns:a16="http://schemas.microsoft.com/office/drawing/2014/main" id="{5298780A-33B9-4EA2-8F67-DE68AD62841B}"/>
+              </a:ext>
+              <a:ext uri="{C183D7F6-B498-43B3-948B-1728B52AA6E4}">
+                <adec:decorative xmlns:adec="http://schemas.microsoft.com/office/drawing/2017/decorative" val="1"/>
+              </a:ext>
+            </a:extLst>
+          </p:cNvPr>
+          <p:cNvSpPr>
+            <a:spLocks noGrp="1" noRot="1" noChangeAspect="1" noMove="1" noResize="1" noEditPoints="1" noAdjustHandles="1" noChangeArrowheads="1" noChangeShapeType="1" noTextEdit="1"/>
+          </p:cNvSpPr>
+          <p:nvPr>
+            <p:extLst>
+              <p:ext uri="{386F3935-93C4-4BCD-93E2-E3B085C9AB24}">
+                <p16:designElem xmlns:p16="http://schemas.microsoft.com/office/powerpoint/2015/main" val="1"/>
+              </p:ext>
+            </p:extLst>
+          </p:nvPr>
+        </p:nvSpPr>
+        <p:spPr>
+          <a:xfrm flipH="1">
+            <a:off x="6432540" y="3335867"/>
+            <a:ext cx="2468880" cy="3200400"/>
+          </a:xfrm>
+          <a:prstGeom prst="rtTriangle">
+            <a:avLst/>
+          </a:prstGeom>
+          <a:solidFill>
+            <a:schemeClr val="accent4"/>
+          </a:solidFill>
+          <a:ln>
+            <a:noFill/>
+          </a:ln>
+        </p:spPr>
+        <p:style>
+          <a:lnRef idx="2">
+            <a:schemeClr val="accent1">
+              <a:shade val="50000"/>
+            </a:schemeClr>
+          </a:lnRef>
+          <a:fillRef idx="1">
+            <a:schemeClr val="accent1"/>
+          </a:fillRef>
+          <a:effectRef idx="0">
+            <a:schemeClr val="accent1"/>
+          </a:effectRef>
+          <a:fontRef idx="minor">
+            <a:schemeClr val="lt1"/>
+          </a:fontRef>
+        </p:style>
+        <p:txBody>
+          <a:bodyPr rtlCol="0" anchor="ctr"/>
+          <a:lstStyle/>
+          <a:p>
+            <a:pPr algn="ctr"/>
+            <a:endParaRPr lang="en-US" dirty="0"/>
+          </a:p>
+        </p:txBody>
+      </p:sp>
+      <p:sp>
+        <p:nvSpPr>
+          <p:cNvPr id="12" name="Rectangle 11">
+            <a:extLst>
+              <a:ext uri="{FF2B5EF4-FFF2-40B4-BE49-F238E27FC236}">
+                <a16:creationId xmlns:a16="http://schemas.microsoft.com/office/drawing/2014/main" id="{7F488E8B-4E1E-4402-8935-D4E6C02615C7}"/>
+              </a:ext>
+              <a:ext uri="{C183D7F6-B498-43B3-948B-1728B52AA6E4}">
+                <adec:decorative xmlns:adec="http://schemas.microsoft.com/office/drawing/2017/decorative" val="1"/>
+              </a:ext>
+            </a:extLst>
+          </p:cNvPr>
+          <p:cNvSpPr>
+            <a:spLocks noGrp="1" noRot="1" noChangeAspect="1" noMove="1" noResize="1" noEditPoints="1" noAdjustHandles="1" noChangeArrowheads="1" noChangeShapeType="1" noTextEdit="1"/>
+          </p:cNvSpPr>
+          <p:nvPr>
+            <p:extLst>
+              <p:ext uri="{386F3935-93C4-4BCD-93E2-E3B085C9AB24}">
+                <p16:designElem xmlns:p16="http://schemas.microsoft.com/office/powerpoint/2015/main" val="1"/>
+              </p:ext>
+            </p:extLst>
+          </p:nvPr>
+        </p:nvSpPr>
+        <p:spPr>
+          <a:xfrm>
+            <a:off x="481330" y="623275"/>
+            <a:ext cx="8178790" cy="5607882"/>
+          </a:xfrm>
+          <a:prstGeom prst="rect">
+            <a:avLst/>
+          </a:prstGeom>
+          <a:noFill/>
+          <a:ln w="19050">
+            <a:solidFill>
+              <a:schemeClr val="tx1">
+                <a:lumMod val="75000"/>
+                <a:lumOff val="25000"/>
+              </a:schemeClr>
+            </a:solidFill>
+          </a:ln>
+        </p:spPr>
+        <p:style>
+          <a:lnRef idx="2">
+            <a:schemeClr val="accent1">
+              <a:shade val="50000"/>
+            </a:schemeClr>
+          </a:lnRef>
+          <a:fillRef idx="1">
+            <a:schemeClr val="accent1"/>
+          </a:fillRef>
+          <a:effectRef idx="0">
+            <a:schemeClr val="accent1"/>
+          </a:effectRef>
+          <a:fontRef idx="minor">
+            <a:schemeClr val="lt1"/>
+          </a:fontRef>
+        </p:style>
+        <p:txBody>
+          <a:bodyPr rtlCol="0" anchor="ctr"/>
+          <a:lstStyle/>
+          <a:p>
+            <a:pPr algn="ctr"/>
+            <a:endParaRPr lang="en-US"/>
+          </a:p>
+        </p:txBody>
+      </p:sp>
+      <p:sp>
+        <p:nvSpPr>
+          <p:cNvPr id="2" name="Title 1"/>
+          <p:cNvSpPr>
+            <a:spLocks noGrp="1"/>
+          </p:cNvSpPr>
+          <p:nvPr>
+            <p:ph type="title"/>
+          </p:nvPr>
+        </p:nvSpPr>
+        <p:spPr>
+          <a:xfrm>
+            <a:off x="963930" y="1050595"/>
+            <a:ext cx="6056111" cy="1618489"/>
+          </a:xfrm>
+        </p:spPr>
+        <p:txBody>
+          <a:bodyPr anchor="ctr">
+            <a:normAutofit/>
+          </a:bodyPr>
+          <a:lstStyle/>
+          <a:p>
+            <a:r>
+              <a:rPr lang="en-CA" sz="6300" dirty="0">
+                <a:solidFill>
+                  <a:schemeClr val="accent1">
+                    <a:lumMod val="75000"/>
+                  </a:schemeClr>
+                </a:solidFill>
+              </a:rPr>
+              <a:t>Project Overview</a:t>
+            </a:r>
+          </a:p>
+        </p:txBody>
+      </p:sp>
+      <p:sp>
+        <p:nvSpPr>
+          <p:cNvPr id="3" name="Content Placeholder 2"/>
+          <p:cNvSpPr>
+            <a:spLocks noGrp="1"/>
+          </p:cNvSpPr>
+          <p:nvPr>
+            <p:ph idx="1"/>
+          </p:nvPr>
+        </p:nvSpPr>
+        <p:spPr>
+          <a:xfrm>
+            <a:off x="963930" y="2969469"/>
+            <a:ext cx="6056111" cy="2412207"/>
+          </a:xfrm>
+        </p:spPr>
+        <p:txBody>
+          <a:bodyPr anchor="t">
+            <a:normAutofit/>
+          </a:bodyPr>
+          <a:lstStyle/>
+          <a:p>
+            <a:r>
+              <a:rPr lang="en-CA" sz="2400" dirty="0"/>
+              <a:t>Unsupervised learning for customer segmentation</a:t>
+            </a:r>
+          </a:p>
+          <a:p>
+            <a:r>
+              <a:rPr lang="en-CA" sz="2400" dirty="0"/>
+              <a:t>Uses RFM features (Recency, Frequency, Monetary)</a:t>
+            </a:r>
+          </a:p>
+          <a:p>
+            <a:r>
+              <a:rPr lang="en-CA" sz="2400" dirty="0"/>
+              <a:t>Goal: discover meaningful customer groups</a:t>
+            </a:r>
+          </a:p>
+        </p:txBody>
+      </p:sp>
+    </p:spTree>
+  </p:cSld>
+  <p:clrMapOvr>
+    <a:masterClrMapping/>
+  </p:clrMapOvr>
+</p:sld>
+</file>
+
+<file path=ppt/slides/slide20.xml><?xml version="1.0" encoding="utf-8"?>
 <p:sld xmlns:a="http://schemas.openxmlformats.org/drawingml/2006/main" xmlns:r="http://schemas.openxmlformats.org/officeDocument/2006/relationships" xmlns:p="http://schemas.openxmlformats.org/presentationml/2006/main">
   <p:cSld>
     <p:bg>
@@ -11458,305 +12170,7 @@
 </p:sld>
 </file>
 
-<file path=ppt/slides/slide2.xml><?xml version="1.0" encoding="utf-8"?>
-<p:sld xmlns:a="http://schemas.openxmlformats.org/drawingml/2006/main" xmlns:r="http://schemas.openxmlformats.org/officeDocument/2006/relationships" xmlns:p="http://schemas.openxmlformats.org/presentationml/2006/main">
-  <p:cSld>
-    <p:bg>
-      <p:bgPr>
-        <a:solidFill>
-          <a:schemeClr val="bg1"/>
-        </a:solidFill>
-        <a:effectLst/>
-      </p:bgPr>
-    </p:bg>
-    <p:spTree>
-      <p:nvGrpSpPr>
-        <p:cNvPr id="1" name=""/>
-        <p:cNvGrpSpPr/>
-        <p:nvPr/>
-      </p:nvGrpSpPr>
-      <p:grpSpPr>
-        <a:xfrm>
-          <a:off x="0" y="0"/>
-          <a:ext cx="0" cy="0"/>
-          <a:chOff x="0" y="0"/>
-          <a:chExt cx="0" cy="0"/>
-        </a:xfrm>
-      </p:grpSpPr>
-      <p:sp useBgFill="1">
-        <p:nvSpPr>
-          <p:cNvPr id="8" name="Rectangle 7">
-            <a:extLst>
-              <a:ext uri="{FF2B5EF4-FFF2-40B4-BE49-F238E27FC236}">
-                <a16:creationId xmlns:a16="http://schemas.microsoft.com/office/drawing/2014/main" id="{081EA652-8C6A-4E69-BEB9-170809474553}"/>
-              </a:ext>
-              <a:ext uri="{C183D7F6-B498-43B3-948B-1728B52AA6E4}">
-                <adec:decorative xmlns:adec="http://schemas.microsoft.com/office/drawing/2017/decorative" val="1"/>
-              </a:ext>
-            </a:extLst>
-          </p:cNvPr>
-          <p:cNvSpPr>
-            <a:spLocks noGrp="1" noRot="1" noChangeAspect="1" noMove="1" noResize="1" noEditPoints="1" noAdjustHandles="1" noChangeArrowheads="1" noChangeShapeType="1" noTextEdit="1"/>
-          </p:cNvSpPr>
-          <p:nvPr>
-            <p:extLst>
-              <p:ext uri="{386F3935-93C4-4BCD-93E2-E3B085C9AB24}">
-                <p16:designElem xmlns:p16="http://schemas.microsoft.com/office/powerpoint/2015/main" val="1"/>
-              </p:ext>
-            </p:extLst>
-          </p:nvPr>
-        </p:nvSpPr>
-        <p:spPr>
-          <a:xfrm>
-            <a:off x="0" y="0"/>
-            <a:ext cx="9144000" cy="6858000"/>
-          </a:xfrm>
-          <a:prstGeom prst="rect">
-            <a:avLst/>
-          </a:prstGeom>
-          <a:ln>
-            <a:noFill/>
-          </a:ln>
-        </p:spPr>
-        <p:style>
-          <a:lnRef idx="2">
-            <a:schemeClr val="accent1">
-              <a:shade val="50000"/>
-            </a:schemeClr>
-          </a:lnRef>
-          <a:fillRef idx="1">
-            <a:schemeClr val="accent1"/>
-          </a:fillRef>
-          <a:effectRef idx="0">
-            <a:schemeClr val="accent1"/>
-          </a:effectRef>
-          <a:fontRef idx="minor">
-            <a:schemeClr val="lt1"/>
-          </a:fontRef>
-        </p:style>
-        <p:txBody>
-          <a:bodyPr rtlCol="0" anchor="ctr"/>
-          <a:lstStyle/>
-          <a:p>
-            <a:pPr algn="ctr"/>
-            <a:endParaRPr lang="en-US"/>
-          </a:p>
-        </p:txBody>
-      </p:sp>
-      <p:sp>
-        <p:nvSpPr>
-          <p:cNvPr id="10" name="Right Triangle 9">
-            <a:extLst>
-              <a:ext uri="{FF2B5EF4-FFF2-40B4-BE49-F238E27FC236}">
-                <a16:creationId xmlns:a16="http://schemas.microsoft.com/office/drawing/2014/main" id="{5298780A-33B9-4EA2-8F67-DE68AD62841B}"/>
-              </a:ext>
-              <a:ext uri="{C183D7F6-B498-43B3-948B-1728B52AA6E4}">
-                <adec:decorative xmlns:adec="http://schemas.microsoft.com/office/drawing/2017/decorative" val="1"/>
-              </a:ext>
-            </a:extLst>
-          </p:cNvPr>
-          <p:cNvSpPr>
-            <a:spLocks noGrp="1" noRot="1" noChangeAspect="1" noMove="1" noResize="1" noEditPoints="1" noAdjustHandles="1" noChangeArrowheads="1" noChangeShapeType="1" noTextEdit="1"/>
-          </p:cNvSpPr>
-          <p:nvPr>
-            <p:extLst>
-              <p:ext uri="{386F3935-93C4-4BCD-93E2-E3B085C9AB24}">
-                <p16:designElem xmlns:p16="http://schemas.microsoft.com/office/powerpoint/2015/main" val="1"/>
-              </p:ext>
-            </p:extLst>
-          </p:nvPr>
-        </p:nvSpPr>
-        <p:spPr>
-          <a:xfrm flipH="1">
-            <a:off x="6432540" y="3335867"/>
-            <a:ext cx="2468880" cy="3200400"/>
-          </a:xfrm>
-          <a:prstGeom prst="rtTriangle">
-            <a:avLst/>
-          </a:prstGeom>
-          <a:solidFill>
-            <a:schemeClr val="accent4"/>
-          </a:solidFill>
-          <a:ln>
-            <a:noFill/>
-          </a:ln>
-        </p:spPr>
-        <p:style>
-          <a:lnRef idx="2">
-            <a:schemeClr val="accent1">
-              <a:shade val="50000"/>
-            </a:schemeClr>
-          </a:lnRef>
-          <a:fillRef idx="1">
-            <a:schemeClr val="accent1"/>
-          </a:fillRef>
-          <a:effectRef idx="0">
-            <a:schemeClr val="accent1"/>
-          </a:effectRef>
-          <a:fontRef idx="minor">
-            <a:schemeClr val="lt1"/>
-          </a:fontRef>
-        </p:style>
-        <p:txBody>
-          <a:bodyPr rtlCol="0" anchor="ctr"/>
-          <a:lstStyle/>
-          <a:p>
-            <a:pPr algn="ctr"/>
-            <a:endParaRPr lang="en-US" dirty="0"/>
-          </a:p>
-        </p:txBody>
-      </p:sp>
-      <p:sp>
-        <p:nvSpPr>
-          <p:cNvPr id="12" name="Rectangle 11">
-            <a:extLst>
-              <a:ext uri="{FF2B5EF4-FFF2-40B4-BE49-F238E27FC236}">
-                <a16:creationId xmlns:a16="http://schemas.microsoft.com/office/drawing/2014/main" id="{7F488E8B-4E1E-4402-8935-D4E6C02615C7}"/>
-              </a:ext>
-              <a:ext uri="{C183D7F6-B498-43B3-948B-1728B52AA6E4}">
-                <adec:decorative xmlns:adec="http://schemas.microsoft.com/office/drawing/2017/decorative" val="1"/>
-              </a:ext>
-            </a:extLst>
-          </p:cNvPr>
-          <p:cNvSpPr>
-            <a:spLocks noGrp="1" noRot="1" noChangeAspect="1" noMove="1" noResize="1" noEditPoints="1" noAdjustHandles="1" noChangeArrowheads="1" noChangeShapeType="1" noTextEdit="1"/>
-          </p:cNvSpPr>
-          <p:nvPr>
-            <p:extLst>
-              <p:ext uri="{386F3935-93C4-4BCD-93E2-E3B085C9AB24}">
-                <p16:designElem xmlns:p16="http://schemas.microsoft.com/office/powerpoint/2015/main" val="1"/>
-              </p:ext>
-            </p:extLst>
-          </p:nvPr>
-        </p:nvSpPr>
-        <p:spPr>
-          <a:xfrm>
-            <a:off x="481330" y="623275"/>
-            <a:ext cx="8178790" cy="5607882"/>
-          </a:xfrm>
-          <a:prstGeom prst="rect">
-            <a:avLst/>
-          </a:prstGeom>
-          <a:noFill/>
-          <a:ln w="19050">
-            <a:solidFill>
-              <a:schemeClr val="tx1">
-                <a:lumMod val="75000"/>
-                <a:lumOff val="25000"/>
-              </a:schemeClr>
-            </a:solidFill>
-          </a:ln>
-        </p:spPr>
-        <p:style>
-          <a:lnRef idx="2">
-            <a:schemeClr val="accent1">
-              <a:shade val="50000"/>
-            </a:schemeClr>
-          </a:lnRef>
-          <a:fillRef idx="1">
-            <a:schemeClr val="accent1"/>
-          </a:fillRef>
-          <a:effectRef idx="0">
-            <a:schemeClr val="accent1"/>
-          </a:effectRef>
-          <a:fontRef idx="minor">
-            <a:schemeClr val="lt1"/>
-          </a:fontRef>
-        </p:style>
-        <p:txBody>
-          <a:bodyPr rtlCol="0" anchor="ctr"/>
-          <a:lstStyle/>
-          <a:p>
-            <a:pPr algn="ctr"/>
-            <a:endParaRPr lang="en-US"/>
-          </a:p>
-        </p:txBody>
-      </p:sp>
-      <p:sp>
-        <p:nvSpPr>
-          <p:cNvPr id="2" name="Title 1"/>
-          <p:cNvSpPr>
-            <a:spLocks noGrp="1"/>
-          </p:cNvSpPr>
-          <p:nvPr>
-            <p:ph type="title"/>
-          </p:nvPr>
-        </p:nvSpPr>
-        <p:spPr>
-          <a:xfrm>
-            <a:off x="963930" y="1050595"/>
-            <a:ext cx="6056111" cy="1618489"/>
-          </a:xfrm>
-        </p:spPr>
-        <p:txBody>
-          <a:bodyPr anchor="ctr">
-            <a:normAutofit/>
-          </a:bodyPr>
-          <a:lstStyle/>
-          <a:p>
-            <a:r>
-              <a:rPr lang="en-CA" sz="6300" dirty="0">
-                <a:solidFill>
-                  <a:schemeClr val="accent1">
-                    <a:lumMod val="75000"/>
-                  </a:schemeClr>
-                </a:solidFill>
-              </a:rPr>
-              <a:t>Project Overview</a:t>
-            </a:r>
-          </a:p>
-        </p:txBody>
-      </p:sp>
-      <p:sp>
-        <p:nvSpPr>
-          <p:cNvPr id="3" name="Content Placeholder 2"/>
-          <p:cNvSpPr>
-            <a:spLocks noGrp="1"/>
-          </p:cNvSpPr>
-          <p:nvPr>
-            <p:ph idx="1"/>
-          </p:nvPr>
-        </p:nvSpPr>
-        <p:spPr>
-          <a:xfrm>
-            <a:off x="963930" y="2969469"/>
-            <a:ext cx="6056111" cy="2412207"/>
-          </a:xfrm>
-        </p:spPr>
-        <p:txBody>
-          <a:bodyPr anchor="t">
-            <a:normAutofit/>
-          </a:bodyPr>
-          <a:lstStyle/>
-          <a:p>
-            <a:r>
-              <a:rPr lang="en-CA" sz="2400" dirty="0"/>
-              <a:t>Unsupervised learning for customer segmentation</a:t>
-            </a:r>
-          </a:p>
-          <a:p>
-            <a:r>
-              <a:rPr lang="en-CA" sz="2400" dirty="0"/>
-              <a:t>Uses RFM features (Recency, Frequency, Monetary)</a:t>
-            </a:r>
-          </a:p>
-          <a:p>
-            <a:r>
-              <a:rPr lang="en-CA" sz="2400" dirty="0"/>
-              <a:t>Goal: discover meaningful customer groups</a:t>
-            </a:r>
-          </a:p>
-        </p:txBody>
-      </p:sp>
-    </p:spTree>
-  </p:cSld>
-  <p:clrMapOvr>
-    <a:masterClrMapping/>
-  </p:clrMapOvr>
-</p:sld>
-</file>
-
-<file path=ppt/slides/slide20.xml><?xml version="1.0" encoding="utf-8"?>
+<file path=ppt/slides/slide21.xml><?xml version="1.0" encoding="utf-8"?>
 <p:sld xmlns:a="http://schemas.openxmlformats.org/drawingml/2006/main" xmlns:r="http://schemas.openxmlformats.org/officeDocument/2006/relationships" xmlns:p="http://schemas.openxmlformats.org/presentationml/2006/main">
   <p:cSld>
     <p:bg>
@@ -11992,7 +12406,7 @@
 </p:sld>
 </file>
 
-<file path=ppt/slides/slide21.xml><?xml version="1.0" encoding="utf-8"?>
+<file path=ppt/slides/slide22.xml><?xml version="1.0" encoding="utf-8"?>
 <p:sld xmlns:a="http://schemas.openxmlformats.org/drawingml/2006/main" xmlns:r="http://schemas.openxmlformats.org/officeDocument/2006/relationships" xmlns:p="http://schemas.openxmlformats.org/presentationml/2006/main">
   <p:cSld>
     <p:bg>
@@ -12295,7 +12709,7 @@
 </p:sld>
 </file>
 
-<file path=ppt/slides/slide22.xml><?xml version="1.0" encoding="utf-8"?>
+<file path=ppt/slides/slide23.xml><?xml version="1.0" encoding="utf-8"?>
 <p:sld xmlns:a="http://schemas.openxmlformats.org/drawingml/2006/main" xmlns:r="http://schemas.openxmlformats.org/officeDocument/2006/relationships" xmlns:p="http://schemas.openxmlformats.org/presentationml/2006/main">
   <p:cSld>
     <p:bg>
@@ -12643,7 +13057,7 @@
 </p:sld>
 </file>
 
-<file path=ppt/slides/slide23.xml><?xml version="1.0" encoding="utf-8"?>
+<file path=ppt/slides/slide24.xml><?xml version="1.0" encoding="utf-8"?>
 <p:sld xmlns:a="http://schemas.openxmlformats.org/drawingml/2006/main" xmlns:r="http://schemas.openxmlformats.org/officeDocument/2006/relationships" xmlns:p="http://schemas.openxmlformats.org/presentationml/2006/main">
   <p:cSld>
     <p:bg>
@@ -13376,7 +13790,7 @@
 </p:sld>
 </file>
 
-<file path=ppt/slides/slide24.xml><?xml version="1.0" encoding="utf-8"?>
+<file path=ppt/slides/slide25.xml><?xml version="1.0" encoding="utf-8"?>
 <p:sld xmlns:a="http://schemas.openxmlformats.org/drawingml/2006/main" xmlns:r="http://schemas.openxmlformats.org/officeDocument/2006/relationships" xmlns:p="http://schemas.openxmlformats.org/presentationml/2006/main">
   <p:cSld>
     <p:bg>
@@ -14003,7 +14417,7 @@
 </p:sld>
 </file>
 
-<file path=ppt/slides/slide25.xml><?xml version="1.0" encoding="utf-8"?>
+<file path=ppt/slides/slide26.xml><?xml version="1.0" encoding="utf-8"?>
 <p:sld xmlns:a="http://schemas.openxmlformats.org/drawingml/2006/main" xmlns:r="http://schemas.openxmlformats.org/officeDocument/2006/relationships" xmlns:p="http://schemas.openxmlformats.org/presentationml/2006/main">
   <p:cSld>
     <p:bg>
@@ -15206,133 +15620,38 @@
           </a:custGeom>
         </p:spPr>
       </p:pic>
-      <p:sp>
-        <p:nvSpPr>
-          <p:cNvPr id="18" name="Content Placeholder 17">
+      <p:pic>
+        <p:nvPicPr>
+          <p:cNvPr id="2" name="Content Placeholder 1" descr="A screenshot of a graph&#10;&#10;AI-generated content may be incorrect.">
             <a:extLst>
               <a:ext uri="{FF2B5EF4-FFF2-40B4-BE49-F238E27FC236}">
-                <a16:creationId xmlns:a16="http://schemas.microsoft.com/office/drawing/2014/main" id="{341BEE0F-6031-71B7-63E6-BB7C35A6EA44}"/>
+                <a16:creationId xmlns:a16="http://schemas.microsoft.com/office/drawing/2014/main" id="{BB067BC9-0A06-551D-4AD6-10F963B1B20B}"/>
               </a:ext>
             </a:extLst>
           </p:cNvPr>
-          <p:cNvSpPr>
-            <a:spLocks noGrp="1"/>
-          </p:cNvSpPr>
+          <p:cNvPicPr>
+            <a:picLocks noGrp="1" noChangeAspect="1"/>
+          </p:cNvPicPr>
           <p:nvPr>
             <p:ph idx="1"/>
           </p:nvPr>
-        </p:nvSpPr>
+        </p:nvPicPr>
+        <p:blipFill>
+          <a:blip r:embed="rId4"/>
+          <a:stretch>
+            <a:fillRect/>
+          </a:stretch>
+        </p:blipFill>
         <p:spPr>
           <a:xfrm>
-            <a:off x="743526" y="3793447"/>
-            <a:ext cx="7656945" cy="2491521"/>
+            <a:off x="601134" y="3751489"/>
+            <a:ext cx="7738533" cy="2258510"/>
           </a:xfrm>
+          <a:prstGeom prst="rect">
+            <a:avLst/>
+          </a:prstGeom>
         </p:spPr>
-        <p:txBody>
-          <a:bodyPr>
-            <a:normAutofit fontScale="25000" lnSpcReduction="20000"/>
-          </a:bodyPr>
-          <a:lstStyle/>
-          <a:p>
-            <a:pPr marL="0" indent="0">
-              <a:buNone/>
-            </a:pPr>
-            <a:r>
-              <a:rPr lang="en-CA" sz="6200" dirty="0"/>
-              <a:t>These three clusters help the business tailor its strategy:</a:t>
-            </a:r>
-          </a:p>
-          <a:p>
-            <a:r>
-              <a:rPr lang="en-CA" sz="6200" b="1" dirty="0">
-                <a:solidFill>
-                  <a:srgbClr val="7030A0"/>
-                </a:solidFill>
-              </a:rPr>
-              <a:t>Cluster 0 (low-value customers):</a:t>
-            </a:r>
-            <a:r>
-              <a:rPr lang="en-CA" sz="6200" dirty="0">
-                <a:solidFill>
-                  <a:srgbClr val="7030A0"/>
-                </a:solidFill>
-              </a:rPr>
-              <a:t> </a:t>
-            </a:r>
-            <a:r>
-              <a:rPr lang="en-CA" sz="6200" dirty="0"/>
-              <a:t>use low-cost marketing or re-engagement campaigns without overspending on acquisition.</a:t>
-            </a:r>
-          </a:p>
-          <a:p>
-            <a:r>
-              <a:rPr lang="en-CA" sz="6200" b="1" dirty="0">
-                <a:solidFill>
-                  <a:srgbClr val="7030A0"/>
-                </a:solidFill>
-              </a:rPr>
-              <a:t>Cluster 1 (moderate customers):</a:t>
-            </a:r>
-            <a:r>
-              <a:rPr lang="en-CA" sz="6200" dirty="0">
-                <a:solidFill>
-                  <a:srgbClr val="7030A0"/>
-                </a:solidFill>
-              </a:rPr>
-              <a:t> </a:t>
-            </a:r>
-            <a:r>
-              <a:rPr lang="en-CA" sz="6200" dirty="0"/>
-              <a:t>target with promotions to increase spending and move them toward high-value status.</a:t>
-            </a:r>
-          </a:p>
-          <a:p>
-            <a:r>
-              <a:rPr lang="en-CA" sz="6200" b="1" dirty="0">
-                <a:solidFill>
-                  <a:srgbClr val="7030A0"/>
-                </a:solidFill>
-              </a:rPr>
-              <a:t>Cluster 2 (high-value customers):</a:t>
-            </a:r>
-            <a:r>
-              <a:rPr lang="en-CA" sz="6200" dirty="0">
-                <a:solidFill>
-                  <a:srgbClr val="7030A0"/>
-                </a:solidFill>
-              </a:rPr>
-              <a:t> </a:t>
-            </a:r>
-            <a:r>
-              <a:rPr lang="en-CA" sz="6200" dirty="0"/>
-              <a:t>prioritize with loyalty rewards and personalized offers to maximize retention and revenue.</a:t>
-            </a:r>
-          </a:p>
-          <a:p>
-            <a:pPr marL="0" indent="0">
-              <a:buNone/>
-            </a:pPr>
-            <a:br>
-              <a:rPr lang="en-CA" sz="6200" dirty="0"/>
-            </a:br>
-            <a:r>
-              <a:rPr lang="en-CA" sz="6200" dirty="0"/>
-              <a:t>Together, these insights allow the company to </a:t>
-            </a:r>
-            <a:r>
-              <a:rPr lang="en-CA" sz="6200" b="1" dirty="0"/>
-              <a:t>optimize marketing budget, improve retention, and increase profitability</a:t>
-            </a:r>
-            <a:r>
-              <a:rPr lang="en-CA" sz="6200" dirty="0"/>
-              <a:t>.</a:t>
-            </a:r>
-          </a:p>
-          <a:p>
-            <a:endParaRPr lang="en-US" dirty="0"/>
-          </a:p>
-        </p:txBody>
-      </p:sp>
+      </p:pic>
     </p:spTree>
     <p:extLst>
       <p:ext uri="{BB962C8B-B14F-4D97-AF65-F5344CB8AC3E}">
@@ -15347,6 +15666,468 @@
 </file>
 
 <file path=ppt/slides/slide6.xml><?xml version="1.0" encoding="utf-8"?>
+<p:sld xmlns:a="http://schemas.openxmlformats.org/drawingml/2006/main" xmlns:r="http://schemas.openxmlformats.org/officeDocument/2006/relationships" xmlns:p="http://schemas.openxmlformats.org/presentationml/2006/main">
+  <p:cSld>
+    <p:bg>
+      <p:bgPr>
+        <a:solidFill>
+          <a:schemeClr val="bg1"/>
+        </a:solidFill>
+        <a:effectLst/>
+      </p:bgPr>
+    </p:bg>
+    <p:spTree>
+      <p:nvGrpSpPr>
+        <p:cNvPr id="1" name="">
+          <a:extLst>
+            <a:ext uri="{FF2B5EF4-FFF2-40B4-BE49-F238E27FC236}">
+              <a16:creationId xmlns:a16="http://schemas.microsoft.com/office/drawing/2014/main" id="{537C403D-A6D7-4631-6C2B-E5E722C28F5D}"/>
+            </a:ext>
+          </a:extLst>
+        </p:cNvPr>
+        <p:cNvGrpSpPr/>
+        <p:nvPr/>
+      </p:nvGrpSpPr>
+      <p:grpSpPr>
+        <a:xfrm>
+          <a:off x="0" y="0"/>
+          <a:ext cx="0" cy="0"/>
+          <a:chOff x="0" y="0"/>
+          <a:chExt cx="0" cy="0"/>
+        </a:xfrm>
+      </p:grpSpPr>
+      <p:sp useBgFill="1">
+        <p:nvSpPr>
+          <p:cNvPr id="21" name="Rectangle 20">
+            <a:extLst>
+              <a:ext uri="{FF2B5EF4-FFF2-40B4-BE49-F238E27FC236}">
+                <a16:creationId xmlns:a16="http://schemas.microsoft.com/office/drawing/2014/main" id="{5F3C33E0-8692-3545-A148-8A330EB8619C}"/>
+              </a:ext>
+              <a:ext uri="{C183D7F6-B498-43B3-948B-1728B52AA6E4}">
+                <adec:decorative xmlns:adec="http://schemas.microsoft.com/office/drawing/2017/decorative" val="1"/>
+              </a:ext>
+            </a:extLst>
+          </p:cNvPr>
+          <p:cNvSpPr>
+            <a:spLocks noGrp="1" noRot="1" noChangeAspect="1" noMove="1" noResize="1" noEditPoints="1" noAdjustHandles="1" noChangeArrowheads="1" noChangeShapeType="1" noTextEdit="1"/>
+          </p:cNvSpPr>
+          <p:nvPr>
+            <p:extLst>
+              <p:ext uri="{386F3935-93C4-4BCD-93E2-E3B085C9AB24}">
+                <p16:designElem xmlns:p16="http://schemas.microsoft.com/office/powerpoint/2015/main" val="1"/>
+              </p:ext>
+            </p:extLst>
+          </p:nvPr>
+        </p:nvSpPr>
+        <p:spPr bwMode="white">
+          <a:xfrm>
+            <a:off x="0" y="0"/>
+            <a:ext cx="9144000" cy="6858000"/>
+          </a:xfrm>
+          <a:prstGeom prst="rect">
+            <a:avLst/>
+          </a:prstGeom>
+          <a:ln>
+            <a:noFill/>
+          </a:ln>
+        </p:spPr>
+        <p:style>
+          <a:lnRef idx="2">
+            <a:schemeClr val="accent1">
+              <a:shade val="50000"/>
+            </a:schemeClr>
+          </a:lnRef>
+          <a:fillRef idx="1">
+            <a:schemeClr val="accent1"/>
+          </a:fillRef>
+          <a:effectRef idx="0">
+            <a:schemeClr val="accent1"/>
+          </a:effectRef>
+          <a:fontRef idx="minor">
+            <a:schemeClr val="lt1"/>
+          </a:fontRef>
+        </p:style>
+        <p:txBody>
+          <a:bodyPr rtlCol="0" anchor="ctr"/>
+          <a:lstStyle>
+            <a:defPPr>
+              <a:defRPr lang="en-US"/>
+            </a:defPPr>
+            <a:lvl1pPr marL="0" algn="l" defTabSz="914400" rtl="0" eaLnBrk="1" latinLnBrk="0" hangingPunct="1">
+              <a:defRPr sz="1800" kern="1200">
+                <a:solidFill>
+                  <a:schemeClr val="lt1"/>
+                </a:solidFill>
+                <a:latin typeface="+mn-lt"/>
+                <a:ea typeface="+mn-ea"/>
+                <a:cs typeface="+mn-cs"/>
+              </a:defRPr>
+            </a:lvl1pPr>
+            <a:lvl2pPr marL="457200" algn="l" defTabSz="914400" rtl="0" eaLnBrk="1" latinLnBrk="0" hangingPunct="1">
+              <a:defRPr sz="1800" kern="1200">
+                <a:solidFill>
+                  <a:schemeClr val="lt1"/>
+                </a:solidFill>
+                <a:latin typeface="+mn-lt"/>
+                <a:ea typeface="+mn-ea"/>
+                <a:cs typeface="+mn-cs"/>
+              </a:defRPr>
+            </a:lvl2pPr>
+            <a:lvl3pPr marL="914400" algn="l" defTabSz="914400" rtl="0" eaLnBrk="1" latinLnBrk="0" hangingPunct="1">
+              <a:defRPr sz="1800" kern="1200">
+                <a:solidFill>
+                  <a:schemeClr val="lt1"/>
+                </a:solidFill>
+                <a:latin typeface="+mn-lt"/>
+                <a:ea typeface="+mn-ea"/>
+                <a:cs typeface="+mn-cs"/>
+              </a:defRPr>
+            </a:lvl3pPr>
+            <a:lvl4pPr marL="1371600" algn="l" defTabSz="914400" rtl="0" eaLnBrk="1" latinLnBrk="0" hangingPunct="1">
+              <a:defRPr sz="1800" kern="1200">
+                <a:solidFill>
+                  <a:schemeClr val="lt1"/>
+                </a:solidFill>
+                <a:latin typeface="+mn-lt"/>
+                <a:ea typeface="+mn-ea"/>
+                <a:cs typeface="+mn-cs"/>
+              </a:defRPr>
+            </a:lvl4pPr>
+            <a:lvl5pPr marL="1828800" algn="l" defTabSz="914400" rtl="0" eaLnBrk="1" latinLnBrk="0" hangingPunct="1">
+              <a:defRPr sz="1800" kern="1200">
+                <a:solidFill>
+                  <a:schemeClr val="lt1"/>
+                </a:solidFill>
+                <a:latin typeface="+mn-lt"/>
+                <a:ea typeface="+mn-ea"/>
+                <a:cs typeface="+mn-cs"/>
+              </a:defRPr>
+            </a:lvl5pPr>
+            <a:lvl6pPr marL="2286000" algn="l" defTabSz="914400" rtl="0" eaLnBrk="1" latinLnBrk="0" hangingPunct="1">
+              <a:defRPr sz="1800" kern="1200">
+                <a:solidFill>
+                  <a:schemeClr val="lt1"/>
+                </a:solidFill>
+                <a:latin typeface="+mn-lt"/>
+                <a:ea typeface="+mn-ea"/>
+                <a:cs typeface="+mn-cs"/>
+              </a:defRPr>
+            </a:lvl6pPr>
+            <a:lvl7pPr marL="2743200" algn="l" defTabSz="914400" rtl="0" eaLnBrk="1" latinLnBrk="0" hangingPunct="1">
+              <a:defRPr sz="1800" kern="1200">
+                <a:solidFill>
+                  <a:schemeClr val="lt1"/>
+                </a:solidFill>
+                <a:latin typeface="+mn-lt"/>
+                <a:ea typeface="+mn-ea"/>
+                <a:cs typeface="+mn-cs"/>
+              </a:defRPr>
+            </a:lvl7pPr>
+            <a:lvl8pPr marL="3200400" algn="l" defTabSz="914400" rtl="0" eaLnBrk="1" latinLnBrk="0" hangingPunct="1">
+              <a:defRPr sz="1800" kern="1200">
+                <a:solidFill>
+                  <a:schemeClr val="lt1"/>
+                </a:solidFill>
+                <a:latin typeface="+mn-lt"/>
+                <a:ea typeface="+mn-ea"/>
+                <a:cs typeface="+mn-cs"/>
+              </a:defRPr>
+            </a:lvl8pPr>
+            <a:lvl9pPr marL="3657600" algn="l" defTabSz="914400" rtl="0" eaLnBrk="1" latinLnBrk="0" hangingPunct="1">
+              <a:defRPr sz="1800" kern="1200">
+                <a:solidFill>
+                  <a:schemeClr val="lt1"/>
+                </a:solidFill>
+                <a:latin typeface="+mn-lt"/>
+                <a:ea typeface="+mn-ea"/>
+                <a:cs typeface="+mn-cs"/>
+              </a:defRPr>
+            </a:lvl9pPr>
+          </a:lstStyle>
+          <a:p>
+            <a:pPr algn="ctr"/>
+            <a:endParaRPr lang="en-US"/>
+          </a:p>
+        </p:txBody>
+      </p:sp>
+      <p:sp>
+        <p:nvSpPr>
+          <p:cNvPr id="23" name="Arc 22">
+            <a:extLst>
+              <a:ext uri="{FF2B5EF4-FFF2-40B4-BE49-F238E27FC236}">
+                <a16:creationId xmlns:a16="http://schemas.microsoft.com/office/drawing/2014/main" id="{46CBC21F-6203-25A5-5B3D-F2FEE85905B0}"/>
+              </a:ext>
+              <a:ext uri="{C183D7F6-B498-43B3-948B-1728B52AA6E4}">
+                <adec:decorative xmlns:adec="http://schemas.microsoft.com/office/drawing/2017/decorative" val="1"/>
+              </a:ext>
+            </a:extLst>
+          </p:cNvPr>
+          <p:cNvSpPr>
+            <a:spLocks noGrp="1" noRot="1" noChangeAspect="1" noMove="1" noResize="1" noEditPoints="1" noAdjustHandles="1" noChangeArrowheads="1" noChangeShapeType="1" noTextEdit="1"/>
+          </p:cNvSpPr>
+          <p:nvPr>
+            <p:extLst>
+              <p:ext uri="{386F3935-93C4-4BCD-93E2-E3B085C9AB24}">
+                <p16:designElem xmlns:p16="http://schemas.microsoft.com/office/powerpoint/2015/main" val="1"/>
+              </p:ext>
+            </p:extLst>
+          </p:nvPr>
+        </p:nvSpPr>
+        <p:spPr>
+          <a:xfrm rot="6269068">
+            <a:off x="6164896" y="3712762"/>
+            <a:ext cx="2987899" cy="2240924"/>
+          </a:xfrm>
+          <a:prstGeom prst="arc">
+            <a:avLst>
+              <a:gd name="adj1" fmla="val 14441841"/>
+              <a:gd name="adj2" fmla="val 0"/>
+            </a:avLst>
+          </a:prstGeom>
+          <a:ln w="127000" cap="rnd">
+            <a:solidFill>
+              <a:schemeClr val="accent4"/>
+            </a:solidFill>
+            <a:prstDash val="dash"/>
+            <a:miter lim="800000"/>
+          </a:ln>
+        </p:spPr>
+        <p:style>
+          <a:lnRef idx="1">
+            <a:schemeClr val="accent1"/>
+          </a:lnRef>
+          <a:fillRef idx="0">
+            <a:schemeClr val="accent1"/>
+          </a:fillRef>
+          <a:effectRef idx="0">
+            <a:schemeClr val="accent1"/>
+          </a:effectRef>
+          <a:fontRef idx="minor">
+            <a:schemeClr val="tx1"/>
+          </a:fontRef>
+        </p:style>
+        <p:txBody>
+          <a:bodyPr rtlCol="0" anchor="ctr"/>
+          <a:lstStyle/>
+          <a:p>
+            <a:pPr marL="0" marR="0" lvl="0" indent="0" algn="ctr" defTabSz="914400" rtl="0" eaLnBrk="1" fontAlgn="auto" latinLnBrk="0" hangingPunct="1">
+              <a:lnSpc>
+                <a:spcPct val="100000"/>
+              </a:lnSpc>
+              <a:spcBef>
+                <a:spcPts val="0"/>
+              </a:spcBef>
+              <a:spcAft>
+                <a:spcPts val="0"/>
+              </a:spcAft>
+              <a:buClrTx/>
+              <a:buSzTx/>
+              <a:buFontTx/>
+              <a:buNone/>
+              <a:tabLst/>
+              <a:defRPr/>
+            </a:pPr>
+            <a:endParaRPr kumimoji="0" lang="en-US" sz="1800" b="0" i="0" u="none" strike="noStrike" kern="1200" cap="none" spc="0" normalizeH="0" baseline="0" noProof="0">
+              <a:ln>
+                <a:noFill/>
+              </a:ln>
+              <a:solidFill>
+                <a:srgbClr val="000000"/>
+              </a:solidFill>
+              <a:effectLst/>
+              <a:uLnTx/>
+              <a:uFillTx/>
+              <a:latin typeface="Calibri" panose="020F0502020204030204"/>
+              <a:ea typeface="+mn-ea"/>
+              <a:cs typeface="+mn-cs"/>
+            </a:endParaRPr>
+          </a:p>
+        </p:txBody>
+      </p:sp>
+      <p:sp>
+        <p:nvSpPr>
+          <p:cNvPr id="18" name="Content Placeholder 17">
+            <a:extLst>
+              <a:ext uri="{FF2B5EF4-FFF2-40B4-BE49-F238E27FC236}">
+                <a16:creationId xmlns:a16="http://schemas.microsoft.com/office/drawing/2014/main" id="{D4924C68-7EA1-F899-4F43-4B5749EEE20F}"/>
+              </a:ext>
+            </a:extLst>
+          </p:cNvPr>
+          <p:cNvSpPr>
+            <a:spLocks noGrp="1"/>
+          </p:cNvSpPr>
+          <p:nvPr>
+            <p:ph idx="1"/>
+          </p:nvPr>
+        </p:nvSpPr>
+        <p:spPr>
+          <a:xfrm>
+            <a:off x="812030" y="2286380"/>
+            <a:ext cx="7655405" cy="3453426"/>
+          </a:xfrm>
+        </p:spPr>
+        <p:txBody>
+          <a:bodyPr>
+            <a:noAutofit/>
+          </a:bodyPr>
+          <a:lstStyle/>
+          <a:p>
+            <a:pPr marL="0" indent="0">
+              <a:buNone/>
+            </a:pPr>
+            <a:r>
+              <a:rPr lang="en-CA" sz="1800" dirty="0"/>
+              <a:t>These three clusters help the business tailor its strategy:</a:t>
+            </a:r>
+          </a:p>
+          <a:p>
+            <a:r>
+              <a:rPr lang="en-CA" sz="1800" b="1" dirty="0">
+                <a:solidFill>
+                  <a:srgbClr val="7030A0"/>
+                </a:solidFill>
+              </a:rPr>
+              <a:t>Cluster 0 (low-value customers):</a:t>
+            </a:r>
+            <a:r>
+              <a:rPr lang="en-CA" sz="1800" dirty="0">
+                <a:solidFill>
+                  <a:srgbClr val="7030A0"/>
+                </a:solidFill>
+              </a:rPr>
+              <a:t> </a:t>
+            </a:r>
+            <a:r>
+              <a:rPr lang="en-CA" sz="1800" dirty="0"/>
+              <a:t>use low-cost marketing or re-engagement campaigns without overspending on acquisition.</a:t>
+            </a:r>
+          </a:p>
+          <a:p>
+            <a:r>
+              <a:rPr lang="en-CA" sz="1800" b="1" dirty="0">
+                <a:solidFill>
+                  <a:srgbClr val="7030A0"/>
+                </a:solidFill>
+              </a:rPr>
+              <a:t>Cluster 1 (moderate customers):</a:t>
+            </a:r>
+            <a:r>
+              <a:rPr lang="en-CA" sz="1800" dirty="0">
+                <a:solidFill>
+                  <a:srgbClr val="7030A0"/>
+                </a:solidFill>
+              </a:rPr>
+              <a:t> </a:t>
+            </a:r>
+            <a:r>
+              <a:rPr lang="en-CA" sz="1800" dirty="0"/>
+              <a:t>target with promotions to increase spending and move them toward high-value status.</a:t>
+            </a:r>
+          </a:p>
+          <a:p>
+            <a:r>
+              <a:rPr lang="en-CA" sz="1800" b="1" dirty="0">
+                <a:solidFill>
+                  <a:srgbClr val="7030A0"/>
+                </a:solidFill>
+              </a:rPr>
+              <a:t>Cluster 2 (high-value customers):</a:t>
+            </a:r>
+            <a:r>
+              <a:rPr lang="en-CA" sz="1800" dirty="0">
+                <a:solidFill>
+                  <a:srgbClr val="7030A0"/>
+                </a:solidFill>
+              </a:rPr>
+              <a:t> </a:t>
+            </a:r>
+            <a:r>
+              <a:rPr lang="en-CA" sz="1800" dirty="0"/>
+              <a:t>prioritize with loyalty rewards and personalized offers to maximize retention and revenue.</a:t>
+            </a:r>
+          </a:p>
+          <a:p>
+            <a:pPr marL="0" indent="0">
+              <a:buNone/>
+            </a:pPr>
+            <a:br>
+              <a:rPr lang="en-CA" sz="1800" dirty="0"/>
+            </a:br>
+            <a:r>
+              <a:rPr lang="en-CA" sz="1800" dirty="0"/>
+              <a:t>Together, these insights allow the company to </a:t>
+            </a:r>
+            <a:r>
+              <a:rPr lang="en-CA" sz="1800" b="1" dirty="0"/>
+              <a:t>optimize marketing budget, improve retention, and increase profitability</a:t>
+            </a:r>
+            <a:r>
+              <a:rPr lang="en-CA" sz="1800" dirty="0"/>
+              <a:t>.</a:t>
+            </a:r>
+          </a:p>
+          <a:p>
+            <a:endParaRPr lang="en-US" sz="1800" dirty="0"/>
+          </a:p>
+        </p:txBody>
+      </p:sp>
+      <p:sp>
+        <p:nvSpPr>
+          <p:cNvPr id="4" name="TextBox 3">
+            <a:extLst>
+              <a:ext uri="{FF2B5EF4-FFF2-40B4-BE49-F238E27FC236}">
+                <a16:creationId xmlns:a16="http://schemas.microsoft.com/office/drawing/2014/main" id="{1BD8C3A8-4604-03CF-6769-FB7DF4D22EFF}"/>
+              </a:ext>
+            </a:extLst>
+          </p:cNvPr>
+          <p:cNvSpPr txBox="1"/>
+          <p:nvPr/>
+        </p:nvSpPr>
+        <p:spPr>
+          <a:xfrm>
+            <a:off x="1236133" y="1270000"/>
+            <a:ext cx="6519334" cy="461665"/>
+          </a:xfrm>
+          <a:prstGeom prst="rect">
+            <a:avLst/>
+          </a:prstGeom>
+          <a:noFill/>
+        </p:spPr>
+        <p:txBody>
+          <a:bodyPr wrap="square" rtlCol="0">
+            <a:spAutoFit/>
+          </a:bodyPr>
+          <a:lstStyle/>
+          <a:p>
+            <a:pPr algn="ctr"/>
+            <a:r>
+              <a:rPr lang="en-CA" sz="2400" dirty="0">
+                <a:solidFill>
+                  <a:schemeClr val="accent1">
+                    <a:lumMod val="75000"/>
+                  </a:schemeClr>
+                </a:solidFill>
+              </a:rPr>
+              <a:t>Conclusion</a:t>
+            </a:r>
+            <a:endParaRPr lang="en-US" sz="2400" dirty="0"/>
+          </a:p>
+        </p:txBody>
+      </p:sp>
+    </p:spTree>
+    <p:extLst>
+      <p:ext uri="{BB962C8B-B14F-4D97-AF65-F5344CB8AC3E}">
+        <p14:creationId xmlns:p14="http://schemas.microsoft.com/office/powerpoint/2010/main" val="151807233"/>
+      </p:ext>
+    </p:extLst>
+  </p:cSld>
+  <p:clrMapOvr>
+    <a:masterClrMapping/>
+  </p:clrMapOvr>
+</p:sld>
+</file>
+
+<file path=ppt/slides/slide7.xml><?xml version="1.0" encoding="utf-8"?>
 <p:sld xmlns:a="http://schemas.openxmlformats.org/drawingml/2006/main" xmlns:r="http://schemas.openxmlformats.org/officeDocument/2006/relationships" xmlns:p="http://schemas.openxmlformats.org/presentationml/2006/main">
   <p:cSld>
     <p:bg>
@@ -15967,7 +16748,7 @@
 </p:sld>
 </file>
 
-<file path=ppt/slides/slide7.xml><?xml version="1.0" encoding="utf-8"?>
+<file path=ppt/slides/slide8.xml><?xml version="1.0" encoding="utf-8"?>
 <p:sld xmlns:a="http://schemas.openxmlformats.org/drawingml/2006/main" xmlns:r="http://schemas.openxmlformats.org/officeDocument/2006/relationships" xmlns:p="http://schemas.openxmlformats.org/presentationml/2006/main">
   <p:cSld>
     <p:spTree>
@@ -16036,7 +16817,7 @@
 </p:sld>
 </file>
 
-<file path=ppt/slides/slide8.xml><?xml version="1.0" encoding="utf-8"?>
+<file path=ppt/slides/slide9.xml><?xml version="1.0" encoding="utf-8"?>
 <p:sld xmlns:a="http://schemas.openxmlformats.org/drawingml/2006/main" xmlns:r="http://schemas.openxmlformats.org/officeDocument/2006/relationships" xmlns:p="http://schemas.openxmlformats.org/presentationml/2006/main">
   <p:cSld>
     <p:bg>
@@ -16331,320 +17112,6 @@
           </a:prstGeom>
         </p:spPr>
       </p:pic>
-    </p:spTree>
-  </p:cSld>
-  <p:clrMapOvr>
-    <a:masterClrMapping/>
-  </p:clrMapOvr>
-</p:sld>
-</file>
-
-<file path=ppt/slides/slide9.xml><?xml version="1.0" encoding="utf-8"?>
-<p:sld xmlns:a="http://schemas.openxmlformats.org/drawingml/2006/main" xmlns:r="http://schemas.openxmlformats.org/officeDocument/2006/relationships" xmlns:p="http://schemas.openxmlformats.org/presentationml/2006/main">
-  <p:cSld>
-    <p:bg>
-      <p:bgPr>
-        <a:solidFill>
-          <a:schemeClr val="bg1"/>
-        </a:solidFill>
-        <a:effectLst/>
-      </p:bgPr>
-    </p:bg>
-    <p:spTree>
-      <p:nvGrpSpPr>
-        <p:cNvPr id="1" name=""/>
-        <p:cNvGrpSpPr/>
-        <p:nvPr/>
-      </p:nvGrpSpPr>
-      <p:grpSpPr>
-        <a:xfrm>
-          <a:off x="0" y="0"/>
-          <a:ext cx="0" cy="0"/>
-          <a:chOff x="0" y="0"/>
-          <a:chExt cx="0" cy="0"/>
-        </a:xfrm>
-      </p:grpSpPr>
-      <p:sp useBgFill="1">
-        <p:nvSpPr>
-          <p:cNvPr id="8" name="Rectangle 7">
-            <a:extLst>
-              <a:ext uri="{FF2B5EF4-FFF2-40B4-BE49-F238E27FC236}">
-                <a16:creationId xmlns:a16="http://schemas.microsoft.com/office/drawing/2014/main" id="{081EA652-8C6A-4E69-BEB9-170809474553}"/>
-              </a:ext>
-              <a:ext uri="{C183D7F6-B498-43B3-948B-1728B52AA6E4}">
-                <adec:decorative xmlns:adec="http://schemas.microsoft.com/office/drawing/2017/decorative" val="1"/>
-              </a:ext>
-            </a:extLst>
-          </p:cNvPr>
-          <p:cNvSpPr>
-            <a:spLocks noGrp="1" noRot="1" noChangeAspect="1" noMove="1" noResize="1" noEditPoints="1" noAdjustHandles="1" noChangeArrowheads="1" noChangeShapeType="1" noTextEdit="1"/>
-          </p:cNvSpPr>
-          <p:nvPr>
-            <p:extLst>
-              <p:ext uri="{386F3935-93C4-4BCD-93E2-E3B085C9AB24}">
-                <p16:designElem xmlns:p16="http://schemas.microsoft.com/office/powerpoint/2015/main" val="1"/>
-              </p:ext>
-            </p:extLst>
-          </p:nvPr>
-        </p:nvSpPr>
-        <p:spPr>
-          <a:xfrm>
-            <a:off x="0" y="0"/>
-            <a:ext cx="9144000" cy="6858000"/>
-          </a:xfrm>
-          <a:prstGeom prst="rect">
-            <a:avLst/>
-          </a:prstGeom>
-          <a:ln>
-            <a:noFill/>
-          </a:ln>
-        </p:spPr>
-        <p:style>
-          <a:lnRef idx="2">
-            <a:schemeClr val="accent1">
-              <a:shade val="50000"/>
-            </a:schemeClr>
-          </a:lnRef>
-          <a:fillRef idx="1">
-            <a:schemeClr val="accent1"/>
-          </a:fillRef>
-          <a:effectRef idx="0">
-            <a:schemeClr val="accent1"/>
-          </a:effectRef>
-          <a:fontRef idx="minor">
-            <a:schemeClr val="lt1"/>
-          </a:fontRef>
-        </p:style>
-        <p:txBody>
-          <a:bodyPr rtlCol="0" anchor="ctr"/>
-          <a:lstStyle/>
-          <a:p>
-            <a:pPr algn="ctr"/>
-            <a:endParaRPr lang="en-US"/>
-          </a:p>
-        </p:txBody>
-      </p:sp>
-      <p:sp>
-        <p:nvSpPr>
-          <p:cNvPr id="10" name="Right Triangle 9">
-            <a:extLst>
-              <a:ext uri="{FF2B5EF4-FFF2-40B4-BE49-F238E27FC236}">
-                <a16:creationId xmlns:a16="http://schemas.microsoft.com/office/drawing/2014/main" id="{5298780A-33B9-4EA2-8F67-DE68AD62841B}"/>
-              </a:ext>
-              <a:ext uri="{C183D7F6-B498-43B3-948B-1728B52AA6E4}">
-                <adec:decorative xmlns:adec="http://schemas.microsoft.com/office/drawing/2017/decorative" val="1"/>
-              </a:ext>
-            </a:extLst>
-          </p:cNvPr>
-          <p:cNvSpPr>
-            <a:spLocks noGrp="1" noRot="1" noChangeAspect="1" noMove="1" noResize="1" noEditPoints="1" noAdjustHandles="1" noChangeArrowheads="1" noChangeShapeType="1" noTextEdit="1"/>
-          </p:cNvSpPr>
-          <p:nvPr>
-            <p:extLst>
-              <p:ext uri="{386F3935-93C4-4BCD-93E2-E3B085C9AB24}">
-                <p16:designElem xmlns:p16="http://schemas.microsoft.com/office/powerpoint/2015/main" val="1"/>
-              </p:ext>
-            </p:extLst>
-          </p:nvPr>
-        </p:nvSpPr>
-        <p:spPr>
-          <a:xfrm flipH="1">
-            <a:off x="6432540" y="3335867"/>
-            <a:ext cx="2468880" cy="3200400"/>
-          </a:xfrm>
-          <a:prstGeom prst="rtTriangle">
-            <a:avLst/>
-          </a:prstGeom>
-          <a:solidFill>
-            <a:schemeClr val="accent4"/>
-          </a:solidFill>
-          <a:ln>
-            <a:noFill/>
-          </a:ln>
-        </p:spPr>
-        <p:style>
-          <a:lnRef idx="2">
-            <a:schemeClr val="accent1">
-              <a:shade val="50000"/>
-            </a:schemeClr>
-          </a:lnRef>
-          <a:fillRef idx="1">
-            <a:schemeClr val="accent1"/>
-          </a:fillRef>
-          <a:effectRef idx="0">
-            <a:schemeClr val="accent1"/>
-          </a:effectRef>
-          <a:fontRef idx="minor">
-            <a:schemeClr val="lt1"/>
-          </a:fontRef>
-        </p:style>
-        <p:txBody>
-          <a:bodyPr rtlCol="0" anchor="ctr"/>
-          <a:lstStyle/>
-          <a:p>
-            <a:pPr algn="ctr"/>
-            <a:endParaRPr lang="en-US" dirty="0"/>
-          </a:p>
-        </p:txBody>
-      </p:sp>
-      <p:sp>
-        <p:nvSpPr>
-          <p:cNvPr id="12" name="Rectangle 11">
-            <a:extLst>
-              <a:ext uri="{FF2B5EF4-FFF2-40B4-BE49-F238E27FC236}">
-                <a16:creationId xmlns:a16="http://schemas.microsoft.com/office/drawing/2014/main" id="{7F488E8B-4E1E-4402-8935-D4E6C02615C7}"/>
-              </a:ext>
-              <a:ext uri="{C183D7F6-B498-43B3-948B-1728B52AA6E4}">
-                <adec:decorative xmlns:adec="http://schemas.microsoft.com/office/drawing/2017/decorative" val="1"/>
-              </a:ext>
-            </a:extLst>
-          </p:cNvPr>
-          <p:cNvSpPr>
-            <a:spLocks noGrp="1" noRot="1" noChangeAspect="1" noMove="1" noResize="1" noEditPoints="1" noAdjustHandles="1" noChangeArrowheads="1" noChangeShapeType="1" noTextEdit="1"/>
-          </p:cNvSpPr>
-          <p:nvPr>
-            <p:extLst>
-              <p:ext uri="{386F3935-93C4-4BCD-93E2-E3B085C9AB24}">
-                <p16:designElem xmlns:p16="http://schemas.microsoft.com/office/powerpoint/2015/main" val="1"/>
-              </p:ext>
-            </p:extLst>
-          </p:nvPr>
-        </p:nvSpPr>
-        <p:spPr>
-          <a:xfrm>
-            <a:off x="481330" y="623275"/>
-            <a:ext cx="8178790" cy="5607882"/>
-          </a:xfrm>
-          <a:prstGeom prst="rect">
-            <a:avLst/>
-          </a:prstGeom>
-          <a:noFill/>
-          <a:ln w="19050">
-            <a:solidFill>
-              <a:schemeClr val="tx1">
-                <a:lumMod val="75000"/>
-                <a:lumOff val="25000"/>
-              </a:schemeClr>
-            </a:solidFill>
-          </a:ln>
-        </p:spPr>
-        <p:style>
-          <a:lnRef idx="2">
-            <a:schemeClr val="accent1">
-              <a:shade val="50000"/>
-            </a:schemeClr>
-          </a:lnRef>
-          <a:fillRef idx="1">
-            <a:schemeClr val="accent1"/>
-          </a:fillRef>
-          <a:effectRef idx="0">
-            <a:schemeClr val="accent1"/>
-          </a:effectRef>
-          <a:fontRef idx="minor">
-            <a:schemeClr val="lt1"/>
-          </a:fontRef>
-        </p:style>
-        <p:txBody>
-          <a:bodyPr rtlCol="0" anchor="ctr"/>
-          <a:lstStyle/>
-          <a:p>
-            <a:pPr algn="ctr"/>
-            <a:endParaRPr lang="en-US"/>
-          </a:p>
-        </p:txBody>
-      </p:sp>
-      <p:sp>
-        <p:nvSpPr>
-          <p:cNvPr id="2" name="Title 1"/>
-          <p:cNvSpPr>
-            <a:spLocks noGrp="1"/>
-          </p:cNvSpPr>
-          <p:nvPr>
-            <p:ph type="title"/>
-          </p:nvPr>
-        </p:nvSpPr>
-        <p:spPr>
-          <a:xfrm>
-            <a:off x="963930" y="1050595"/>
-            <a:ext cx="6056111" cy="1618489"/>
-          </a:xfrm>
-        </p:spPr>
-        <p:txBody>
-          <a:bodyPr anchor="ctr">
-            <a:normAutofit/>
-          </a:bodyPr>
-          <a:lstStyle/>
-          <a:p>
-            <a:pPr>
-              <a:lnSpc>
-                <a:spcPct val="90000"/>
-              </a:lnSpc>
-            </a:pPr>
-            <a:r>
-              <a:rPr lang="en-CA" sz="5400" dirty="0">
-                <a:solidFill>
-                  <a:schemeClr val="accent1">
-                    <a:lumMod val="75000"/>
-                  </a:schemeClr>
-                </a:solidFill>
-              </a:rPr>
-              <a:t>Data Cleaning &amp; Preprocessing</a:t>
-            </a:r>
-          </a:p>
-        </p:txBody>
-      </p:sp>
-      <p:sp>
-        <p:nvSpPr>
-          <p:cNvPr id="3" name="Content Placeholder 2"/>
-          <p:cNvSpPr>
-            <a:spLocks noGrp="1"/>
-          </p:cNvSpPr>
-          <p:nvPr>
-            <p:ph idx="1"/>
-          </p:nvPr>
-        </p:nvSpPr>
-        <p:spPr>
-          <a:xfrm>
-            <a:off x="963930" y="2969469"/>
-            <a:ext cx="6056111" cy="2800395"/>
-          </a:xfrm>
-        </p:spPr>
-        <p:txBody>
-          <a:bodyPr anchor="t">
-            <a:normAutofit/>
-          </a:bodyPr>
-          <a:lstStyle/>
-          <a:p>
-            <a:r>
-              <a:rPr lang="en-CA" sz="2400" dirty="0"/>
-              <a:t>Removed cancellations &amp; invalid transactions</a:t>
-            </a:r>
-          </a:p>
-          <a:p>
-            <a:r>
-              <a:rPr lang="en-CA" sz="2400" dirty="0"/>
-              <a:t>Added Year, Month, Subtotal, Cancellation Flag</a:t>
-            </a:r>
-          </a:p>
-          <a:p>
-            <a:r>
-              <a:rPr lang="en-CA" sz="2400" dirty="0"/>
-              <a:t>Handled missing </a:t>
-            </a:r>
-            <a:r>
-              <a:rPr lang="en-CA" sz="2400" dirty="0" err="1"/>
-              <a:t>CustomerID</a:t>
-            </a:r>
-            <a:endParaRPr lang="en-CA" sz="2400" dirty="0"/>
-          </a:p>
-          <a:p>
-            <a:r>
-              <a:rPr lang="en-CA" sz="2400" dirty="0"/>
-              <a:t>Final dataset ~538K rows</a:t>
-            </a:r>
-          </a:p>
-        </p:txBody>
-      </p:sp>
     </p:spTree>
   </p:cSld>
   <p:clrMapOvr>

</xml_diff>